<commit_message>
Propuesta Lote, búsqueda y actualización de wireframe
</commit_message>
<xml_diff>
--- a/documentos/DiseñoSkyRanger.pptx
+++ b/documentos/DiseñoSkyRanger.pptx
@@ -7,7 +7,9 @@
   <p:sldIdLst>
     <p:sldId id="256" r:id="rId2"/>
     <p:sldId id="257" r:id="rId3"/>
-    <p:sldId id="258" r:id="rId4"/>
+    <p:sldId id="259" r:id="rId4"/>
+    <p:sldId id="260" r:id="rId5"/>
+    <p:sldId id="258" r:id="rId6"/>
   </p:sldIdLst>
   <p:sldSz cx="9144000" cy="5143500" type="screen16x9"/>
   <p:notesSz cx="6858000" cy="9144000"/>
@@ -5217,7 +5219,7 @@
                     <a:p>
                       <a:pPr algn="ctr"/>
                       <a:r>
-                        <a:rPr lang="es-ES" sz="700" dirty="0" err="1" smtClean="0"/>
+                        <a:rPr lang="es-ES" sz="700" dirty="0" smtClean="0"/>
                         <a:t>Teltonika</a:t>
                       </a:r>
                       <a:endParaRPr lang="es-ES" sz="700" dirty="0"/>
@@ -5367,7 +5369,7 @@
                     <a:p>
                       <a:pPr algn="ctr"/>
                       <a:r>
-                        <a:rPr lang="es-ES" sz="700" dirty="0" err="1" smtClean="0"/>
+                        <a:rPr lang="es-ES" sz="700" dirty="0" smtClean="0"/>
                         <a:t>Teltonika</a:t>
                       </a:r>
                       <a:endParaRPr lang="es-ES" sz="700" dirty="0"/>
@@ -5413,11 +5415,7 @@
                       <a:pPr algn="ctr"/>
                       <a:r>
                         <a:rPr lang="es-ES" sz="700" dirty="0" smtClean="0"/>
-                        <a:t>Q. </a:t>
-                      </a:r>
-                      <a:r>
-                        <a:rPr lang="es-ES" sz="700" dirty="0" smtClean="0"/>
-                        <a:t>95.00</a:t>
+                        <a:t>Q. 95.00</a:t>
                       </a:r>
                       <a:endParaRPr lang="es-ES" sz="700" dirty="0"/>
                     </a:p>
@@ -5447,11 +5445,7 @@
                       <a:pPr algn="ctr"/>
                       <a:r>
                         <a:rPr lang="es-ES" sz="700" dirty="0" smtClean="0"/>
-                        <a:t>Q. </a:t>
-                      </a:r>
-                      <a:r>
-                        <a:rPr lang="es-ES" sz="700" dirty="0" smtClean="0"/>
-                        <a:t>190.00</a:t>
+                        <a:t>Q. 190.00</a:t>
                       </a:r>
                       <a:endParaRPr lang="es-ES" sz="700" dirty="0"/>
                     </a:p>
@@ -5981,6 +5975,2842 @@
 </file>
 
 <file path=ppt/slides/slide3.xml><?xml version="1.0" encoding="utf-8"?>
+<p:sld xmlns:a="http://schemas.openxmlformats.org/drawingml/2006/main" xmlns:r="http://schemas.openxmlformats.org/officeDocument/2006/relationships" xmlns:p="http://schemas.openxmlformats.org/presentationml/2006/main">
+  <p:cSld>
+    <p:spTree>
+      <p:nvGrpSpPr>
+        <p:cNvPr id="1" name=""/>
+        <p:cNvGrpSpPr/>
+        <p:nvPr/>
+      </p:nvGrpSpPr>
+      <p:grpSpPr>
+        <a:xfrm>
+          <a:off x="0" y="0"/>
+          <a:ext cx="0" cy="0"/>
+          <a:chOff x="0" y="0"/>
+          <a:chExt cx="0" cy="0"/>
+        </a:xfrm>
+      </p:grpSpPr>
+      <p:graphicFrame>
+        <p:nvGraphicFramePr>
+          <p:cNvPr id="5" name="4 Tabla"/>
+          <p:cNvGraphicFramePr>
+            <a:graphicFrameLocks noGrp="1"/>
+          </p:cNvGraphicFramePr>
+          <p:nvPr>
+            <p:extLst>
+              <p:ext uri="{D42A27DB-BD31-4B8C-83A1-F6EECF244321}">
+                <p14:modId xmlns:p14="http://schemas.microsoft.com/office/powerpoint/2010/main" val="3740653957"/>
+              </p:ext>
+            </p:extLst>
+          </p:nvPr>
+        </p:nvGraphicFramePr>
+        <p:xfrm>
+          <a:off x="10538" y="608910"/>
+          <a:ext cx="2195736" cy="4501743"/>
+        </p:xfrm>
+        <a:graphic>
+          <a:graphicData uri="http://schemas.openxmlformats.org/drawingml/2006/table">
+            <a:tbl>
+              <a:tblPr firstRow="1" bandRow="1">
+                <a:tableStyleId>{2D5ABB26-0587-4C30-8999-92F81FD0307C}</a:tableStyleId>
+              </a:tblPr>
+              <a:tblGrid>
+                <a:gridCol w="2195736"/>
+              </a:tblGrid>
+              <a:tr h="757743">
+                <a:tc>
+                  <a:txBody>
+                    <a:bodyPr/>
+                    <a:lstStyle/>
+                    <a:p>
+                      <a:endParaRPr lang="es-ES" dirty="0"/>
+                    </a:p>
+                  </a:txBody>
+                  <a:tcPr>
+                    <a:lnL w="12700" cap="flat" cmpd="sng" algn="ctr">
+                      <a:solidFill>
+                        <a:schemeClr val="tx1"/>
+                      </a:solidFill>
+                      <a:prstDash val="solid"/>
+                      <a:round/>
+                      <a:headEnd type="none" w="med" len="med"/>
+                      <a:tailEnd type="none" w="med" len="med"/>
+                    </a:lnL>
+                    <a:lnR w="12700" cap="flat" cmpd="sng" algn="ctr">
+                      <a:solidFill>
+                        <a:schemeClr val="tx1"/>
+                      </a:solidFill>
+                      <a:prstDash val="solid"/>
+                      <a:round/>
+                      <a:headEnd type="none" w="med" len="med"/>
+                      <a:tailEnd type="none" w="med" len="med"/>
+                    </a:lnR>
+                    <a:lnT w="12700" cap="flat" cmpd="sng" algn="ctr">
+                      <a:solidFill>
+                        <a:schemeClr val="tx1"/>
+                      </a:solidFill>
+                      <a:prstDash val="solid"/>
+                      <a:round/>
+                      <a:headEnd type="none" w="med" len="med"/>
+                      <a:tailEnd type="none" w="med" len="med"/>
+                    </a:lnT>
+                    <a:lnB w="12700" cap="flat" cmpd="sng" algn="ctr">
+                      <a:solidFill>
+                        <a:schemeClr val="tx1"/>
+                      </a:solidFill>
+                      <a:prstDash val="solid"/>
+                      <a:round/>
+                      <a:headEnd type="none" w="med" len="med"/>
+                      <a:tailEnd type="none" w="med" len="med"/>
+                    </a:lnB>
+                  </a:tcPr>
+                </a:tc>
+              </a:tr>
+              <a:tr h="468000">
+                <a:tc>
+                  <a:txBody>
+                    <a:bodyPr/>
+                    <a:lstStyle/>
+                    <a:p>
+                      <a:r>
+                        <a:rPr lang="es-ES" sz="1600" dirty="0" smtClean="0"/>
+                        <a:t>Inicio</a:t>
+                      </a:r>
+                      <a:endParaRPr lang="es-ES" sz="1600" dirty="0"/>
+                    </a:p>
+                  </a:txBody>
+                  <a:tcPr anchor="ctr">
+                    <a:lnL w="12700" cap="flat" cmpd="sng" algn="ctr">
+                      <a:solidFill>
+                        <a:schemeClr val="tx1"/>
+                      </a:solidFill>
+                      <a:prstDash val="solid"/>
+                      <a:round/>
+                      <a:headEnd type="none" w="med" len="med"/>
+                      <a:tailEnd type="none" w="med" len="med"/>
+                    </a:lnL>
+                    <a:lnR w="12700" cap="flat" cmpd="sng" algn="ctr">
+                      <a:solidFill>
+                        <a:schemeClr val="tx1"/>
+                      </a:solidFill>
+                      <a:prstDash val="solid"/>
+                      <a:round/>
+                      <a:headEnd type="none" w="med" len="med"/>
+                      <a:tailEnd type="none" w="med" len="med"/>
+                    </a:lnR>
+                    <a:lnT w="12700" cap="flat" cmpd="sng" algn="ctr">
+                      <a:solidFill>
+                        <a:schemeClr val="tx1"/>
+                      </a:solidFill>
+                      <a:prstDash val="solid"/>
+                      <a:round/>
+                      <a:headEnd type="none" w="med" len="med"/>
+                      <a:tailEnd type="none" w="med" len="med"/>
+                    </a:lnT>
+                    <a:lnB w="12700" cap="flat" cmpd="sng" algn="ctr">
+                      <a:solidFill>
+                        <a:schemeClr val="tx1"/>
+                      </a:solidFill>
+                      <a:prstDash val="solid"/>
+                      <a:round/>
+                      <a:headEnd type="none" w="med" len="med"/>
+                      <a:tailEnd type="none" w="med" len="med"/>
+                    </a:lnB>
+                  </a:tcPr>
+                </a:tc>
+              </a:tr>
+              <a:tr h="468000">
+                <a:tc>
+                  <a:txBody>
+                    <a:bodyPr/>
+                    <a:lstStyle/>
+                    <a:p>
+                      <a:r>
+                        <a:rPr lang="es-ES" sz="1600" dirty="0" smtClean="0">
+                          <a:solidFill>
+                            <a:schemeClr val="tx1"/>
+                          </a:solidFill>
+                        </a:rPr>
+                        <a:t>Proveedores</a:t>
+                      </a:r>
+                      <a:endParaRPr lang="es-ES" sz="1600" dirty="0">
+                        <a:solidFill>
+                          <a:schemeClr val="tx1"/>
+                        </a:solidFill>
+                      </a:endParaRPr>
+                    </a:p>
+                  </a:txBody>
+                  <a:tcPr anchor="ctr">
+                    <a:lnL w="12700" cap="flat" cmpd="sng" algn="ctr">
+                      <a:solidFill>
+                        <a:schemeClr val="tx1"/>
+                      </a:solidFill>
+                      <a:prstDash val="solid"/>
+                      <a:round/>
+                      <a:headEnd type="none" w="med" len="med"/>
+                      <a:tailEnd type="none" w="med" len="med"/>
+                    </a:lnL>
+                    <a:lnR w="12700" cap="flat" cmpd="sng" algn="ctr">
+                      <a:solidFill>
+                        <a:schemeClr val="tx1"/>
+                      </a:solidFill>
+                      <a:prstDash val="solid"/>
+                      <a:round/>
+                      <a:headEnd type="none" w="med" len="med"/>
+                      <a:tailEnd type="none" w="med" len="med"/>
+                    </a:lnR>
+                    <a:lnT w="12700" cap="flat" cmpd="sng" algn="ctr">
+                      <a:solidFill>
+                        <a:schemeClr val="tx1"/>
+                      </a:solidFill>
+                      <a:prstDash val="solid"/>
+                      <a:round/>
+                      <a:headEnd type="none" w="med" len="med"/>
+                      <a:tailEnd type="none" w="med" len="med"/>
+                    </a:lnT>
+                    <a:lnB w="12700" cap="flat" cmpd="sng" algn="ctr">
+                      <a:solidFill>
+                        <a:schemeClr val="tx1"/>
+                      </a:solidFill>
+                      <a:prstDash val="solid"/>
+                      <a:round/>
+                      <a:headEnd type="none" w="med" len="med"/>
+                      <a:tailEnd type="none" w="med" len="med"/>
+                    </a:lnB>
+                    <a:noFill/>
+                  </a:tcPr>
+                </a:tc>
+              </a:tr>
+              <a:tr h="468000">
+                <a:tc>
+                  <a:txBody>
+                    <a:bodyPr/>
+                    <a:lstStyle/>
+                    <a:p>
+                      <a:r>
+                        <a:rPr lang="es-ES" sz="1600" dirty="0" smtClean="0"/>
+                        <a:t>Clientes</a:t>
+                      </a:r>
+                      <a:endParaRPr lang="es-ES" sz="1600" dirty="0"/>
+                    </a:p>
+                  </a:txBody>
+                  <a:tcPr anchor="ctr">
+                    <a:lnL w="12700" cap="flat" cmpd="sng" algn="ctr">
+                      <a:solidFill>
+                        <a:schemeClr val="tx1"/>
+                      </a:solidFill>
+                      <a:prstDash val="solid"/>
+                      <a:round/>
+                      <a:headEnd type="none" w="med" len="med"/>
+                      <a:tailEnd type="none" w="med" len="med"/>
+                    </a:lnL>
+                    <a:lnR w="12700" cap="flat" cmpd="sng" algn="ctr">
+                      <a:solidFill>
+                        <a:schemeClr val="tx1"/>
+                      </a:solidFill>
+                      <a:prstDash val="solid"/>
+                      <a:round/>
+                      <a:headEnd type="none" w="med" len="med"/>
+                      <a:tailEnd type="none" w="med" len="med"/>
+                    </a:lnR>
+                    <a:lnT w="12700" cap="flat" cmpd="sng" algn="ctr">
+                      <a:solidFill>
+                        <a:schemeClr val="tx1"/>
+                      </a:solidFill>
+                      <a:prstDash val="solid"/>
+                      <a:round/>
+                      <a:headEnd type="none" w="med" len="med"/>
+                      <a:tailEnd type="none" w="med" len="med"/>
+                    </a:lnT>
+                    <a:lnB w="12700" cap="flat" cmpd="sng" algn="ctr">
+                      <a:solidFill>
+                        <a:schemeClr val="tx1"/>
+                      </a:solidFill>
+                      <a:prstDash val="solid"/>
+                      <a:round/>
+                      <a:headEnd type="none" w="med" len="med"/>
+                      <a:tailEnd type="none" w="med" len="med"/>
+                    </a:lnB>
+                  </a:tcPr>
+                </a:tc>
+              </a:tr>
+              <a:tr h="468000">
+                <a:tc>
+                  <a:txBody>
+                    <a:bodyPr/>
+                    <a:lstStyle/>
+                    <a:p>
+                      <a:r>
+                        <a:rPr lang="es-ES" sz="1600" dirty="0" smtClean="0">
+                          <a:solidFill>
+                            <a:schemeClr val="bg1"/>
+                          </a:solidFill>
+                        </a:rPr>
+                        <a:t>Lotes</a:t>
+                      </a:r>
+                      <a:endParaRPr lang="es-ES" sz="1600" dirty="0">
+                        <a:solidFill>
+                          <a:schemeClr val="bg1"/>
+                        </a:solidFill>
+                      </a:endParaRPr>
+                    </a:p>
+                  </a:txBody>
+                  <a:tcPr anchor="ctr">
+                    <a:lnL w="12700" cap="flat" cmpd="sng" algn="ctr">
+                      <a:solidFill>
+                        <a:schemeClr val="tx1"/>
+                      </a:solidFill>
+                      <a:prstDash val="solid"/>
+                      <a:round/>
+                      <a:headEnd type="none" w="med" len="med"/>
+                      <a:tailEnd type="none" w="med" len="med"/>
+                    </a:lnL>
+                    <a:lnR w="12700" cap="flat" cmpd="sng" algn="ctr">
+                      <a:solidFill>
+                        <a:schemeClr val="tx1"/>
+                      </a:solidFill>
+                      <a:prstDash val="solid"/>
+                      <a:round/>
+                      <a:headEnd type="none" w="med" len="med"/>
+                      <a:tailEnd type="none" w="med" len="med"/>
+                    </a:lnR>
+                    <a:lnT w="12700" cap="flat" cmpd="sng" algn="ctr">
+                      <a:solidFill>
+                        <a:schemeClr val="tx1"/>
+                      </a:solidFill>
+                      <a:prstDash val="solid"/>
+                      <a:round/>
+                      <a:headEnd type="none" w="med" len="med"/>
+                      <a:tailEnd type="none" w="med" len="med"/>
+                    </a:lnT>
+                    <a:lnB w="12700" cap="flat" cmpd="sng" algn="ctr">
+                      <a:solidFill>
+                        <a:schemeClr val="tx1"/>
+                      </a:solidFill>
+                      <a:prstDash val="solid"/>
+                      <a:round/>
+                      <a:headEnd type="none" w="med" len="med"/>
+                      <a:tailEnd type="none" w="med" len="med"/>
+                    </a:lnB>
+                    <a:solidFill>
+                      <a:schemeClr val="tx2"/>
+                    </a:solidFill>
+                  </a:tcPr>
+                </a:tc>
+              </a:tr>
+              <a:tr h="468000">
+                <a:tc>
+                  <a:txBody>
+                    <a:bodyPr/>
+                    <a:lstStyle/>
+                    <a:p>
+                      <a:r>
+                        <a:rPr lang="es-ES" sz="1600" dirty="0" smtClean="0"/>
+                        <a:t>Marcas</a:t>
+                      </a:r>
+                      <a:endParaRPr lang="es-ES" sz="1600" dirty="0"/>
+                    </a:p>
+                  </a:txBody>
+                  <a:tcPr anchor="ctr">
+                    <a:lnL w="12700" cap="flat" cmpd="sng" algn="ctr">
+                      <a:solidFill>
+                        <a:schemeClr val="tx1"/>
+                      </a:solidFill>
+                      <a:prstDash val="solid"/>
+                      <a:round/>
+                      <a:headEnd type="none" w="med" len="med"/>
+                      <a:tailEnd type="none" w="med" len="med"/>
+                    </a:lnL>
+                    <a:lnR w="12700" cap="flat" cmpd="sng" algn="ctr">
+                      <a:solidFill>
+                        <a:schemeClr val="tx1"/>
+                      </a:solidFill>
+                      <a:prstDash val="solid"/>
+                      <a:round/>
+                      <a:headEnd type="none" w="med" len="med"/>
+                      <a:tailEnd type="none" w="med" len="med"/>
+                    </a:lnR>
+                    <a:lnT w="12700" cap="flat" cmpd="sng" algn="ctr">
+                      <a:solidFill>
+                        <a:schemeClr val="tx1"/>
+                      </a:solidFill>
+                      <a:prstDash val="solid"/>
+                      <a:round/>
+                      <a:headEnd type="none" w="med" len="med"/>
+                      <a:tailEnd type="none" w="med" len="med"/>
+                    </a:lnT>
+                    <a:lnB w="12700" cap="flat" cmpd="sng" algn="ctr">
+                      <a:solidFill>
+                        <a:schemeClr val="tx1"/>
+                      </a:solidFill>
+                      <a:prstDash val="solid"/>
+                      <a:round/>
+                      <a:headEnd type="none" w="med" len="med"/>
+                      <a:tailEnd type="none" w="med" len="med"/>
+                    </a:lnB>
+                  </a:tcPr>
+                </a:tc>
+              </a:tr>
+              <a:tr h="468000">
+                <a:tc>
+                  <a:txBody>
+                    <a:bodyPr/>
+                    <a:lstStyle/>
+                    <a:p>
+                      <a:r>
+                        <a:rPr lang="es-ES" sz="1600" dirty="0" smtClean="0"/>
+                        <a:t>GPS</a:t>
+                      </a:r>
+                      <a:endParaRPr lang="es-ES" sz="1600" dirty="0"/>
+                    </a:p>
+                  </a:txBody>
+                  <a:tcPr anchor="ctr">
+                    <a:lnL w="12700" cap="flat" cmpd="sng" algn="ctr">
+                      <a:solidFill>
+                        <a:schemeClr val="tx1"/>
+                      </a:solidFill>
+                      <a:prstDash val="solid"/>
+                      <a:round/>
+                      <a:headEnd type="none" w="med" len="med"/>
+                      <a:tailEnd type="none" w="med" len="med"/>
+                    </a:lnL>
+                    <a:lnR w="12700" cap="flat" cmpd="sng" algn="ctr">
+                      <a:solidFill>
+                        <a:schemeClr val="tx1"/>
+                      </a:solidFill>
+                      <a:prstDash val="solid"/>
+                      <a:round/>
+                      <a:headEnd type="none" w="med" len="med"/>
+                      <a:tailEnd type="none" w="med" len="med"/>
+                    </a:lnR>
+                    <a:lnT w="12700" cap="flat" cmpd="sng" algn="ctr">
+                      <a:solidFill>
+                        <a:schemeClr val="tx1"/>
+                      </a:solidFill>
+                      <a:prstDash val="solid"/>
+                      <a:round/>
+                      <a:headEnd type="none" w="med" len="med"/>
+                      <a:tailEnd type="none" w="med" len="med"/>
+                    </a:lnT>
+                    <a:lnB w="12700" cap="flat" cmpd="sng" algn="ctr">
+                      <a:solidFill>
+                        <a:schemeClr val="tx1"/>
+                      </a:solidFill>
+                      <a:prstDash val="solid"/>
+                      <a:round/>
+                      <a:headEnd type="none" w="med" len="med"/>
+                      <a:tailEnd type="none" w="med" len="med"/>
+                    </a:lnB>
+                  </a:tcPr>
+                </a:tc>
+              </a:tr>
+              <a:tr h="468000">
+                <a:tc>
+                  <a:txBody>
+                    <a:bodyPr/>
+                    <a:lstStyle/>
+                    <a:p>
+                      <a:r>
+                        <a:rPr lang="es-ES" sz="1600" dirty="0" smtClean="0"/>
+                        <a:t>SIM</a:t>
+                      </a:r>
+                      <a:endParaRPr lang="es-ES" sz="1600" dirty="0"/>
+                    </a:p>
+                  </a:txBody>
+                  <a:tcPr anchor="ctr">
+                    <a:lnL w="12700" cap="flat" cmpd="sng" algn="ctr">
+                      <a:solidFill>
+                        <a:schemeClr val="tx1"/>
+                      </a:solidFill>
+                      <a:prstDash val="solid"/>
+                      <a:round/>
+                      <a:headEnd type="none" w="med" len="med"/>
+                      <a:tailEnd type="none" w="med" len="med"/>
+                    </a:lnL>
+                    <a:lnR w="12700" cap="flat" cmpd="sng" algn="ctr">
+                      <a:solidFill>
+                        <a:schemeClr val="tx1"/>
+                      </a:solidFill>
+                      <a:prstDash val="solid"/>
+                      <a:round/>
+                      <a:headEnd type="none" w="med" len="med"/>
+                      <a:tailEnd type="none" w="med" len="med"/>
+                    </a:lnR>
+                    <a:lnT w="12700" cap="flat" cmpd="sng" algn="ctr">
+                      <a:solidFill>
+                        <a:schemeClr val="tx1"/>
+                      </a:solidFill>
+                      <a:prstDash val="solid"/>
+                      <a:round/>
+                      <a:headEnd type="none" w="med" len="med"/>
+                      <a:tailEnd type="none" w="med" len="med"/>
+                    </a:lnT>
+                    <a:lnB w="12700" cap="flat" cmpd="sng" algn="ctr">
+                      <a:solidFill>
+                        <a:schemeClr val="tx1"/>
+                      </a:solidFill>
+                      <a:prstDash val="solid"/>
+                      <a:round/>
+                      <a:headEnd type="none" w="med" len="med"/>
+                      <a:tailEnd type="none" w="med" len="med"/>
+                    </a:lnB>
+                  </a:tcPr>
+                </a:tc>
+              </a:tr>
+              <a:tr h="468000">
+                <a:tc>
+                  <a:txBody>
+                    <a:bodyPr/>
+                    <a:lstStyle/>
+                    <a:p>
+                      <a:r>
+                        <a:rPr lang="es-ES" sz="1600" dirty="0" smtClean="0"/>
+                        <a:t>Vehículos</a:t>
+                      </a:r>
+                      <a:endParaRPr lang="es-ES" sz="1600" dirty="0"/>
+                    </a:p>
+                  </a:txBody>
+                  <a:tcPr anchor="ctr">
+                    <a:lnL w="12700" cap="flat" cmpd="sng" algn="ctr">
+                      <a:solidFill>
+                        <a:schemeClr val="tx1"/>
+                      </a:solidFill>
+                      <a:prstDash val="solid"/>
+                      <a:round/>
+                      <a:headEnd type="none" w="med" len="med"/>
+                      <a:tailEnd type="none" w="med" len="med"/>
+                    </a:lnL>
+                    <a:lnR w="12700" cap="flat" cmpd="sng" algn="ctr">
+                      <a:solidFill>
+                        <a:schemeClr val="tx1"/>
+                      </a:solidFill>
+                      <a:prstDash val="solid"/>
+                      <a:round/>
+                      <a:headEnd type="none" w="med" len="med"/>
+                      <a:tailEnd type="none" w="med" len="med"/>
+                    </a:lnR>
+                    <a:lnT w="12700" cap="flat" cmpd="sng" algn="ctr">
+                      <a:solidFill>
+                        <a:schemeClr val="tx1"/>
+                      </a:solidFill>
+                      <a:prstDash val="solid"/>
+                      <a:round/>
+                      <a:headEnd type="none" w="med" len="med"/>
+                      <a:tailEnd type="none" w="med" len="med"/>
+                    </a:lnT>
+                    <a:lnB w="12700" cap="flat" cmpd="sng" algn="ctr">
+                      <a:solidFill>
+                        <a:schemeClr val="tx1"/>
+                      </a:solidFill>
+                      <a:prstDash val="solid"/>
+                      <a:round/>
+                      <a:headEnd type="none" w="med" len="med"/>
+                      <a:tailEnd type="none" w="med" len="med"/>
+                    </a:lnB>
+                  </a:tcPr>
+                </a:tc>
+              </a:tr>
+            </a:tbl>
+          </a:graphicData>
+        </a:graphic>
+      </p:graphicFrame>
+      <p:pic>
+        <p:nvPicPr>
+          <p:cNvPr id="8" name="7 Imagen"/>
+          <p:cNvPicPr>
+            <a:picLocks noChangeAspect="1"/>
+          </p:cNvPicPr>
+          <p:nvPr/>
+        </p:nvPicPr>
+        <p:blipFill>
+          <a:blip r:embed="rId2">
+            <a:extLst>
+              <a:ext uri="{28A0092B-C50C-407E-A947-70E740481C1C}">
+                <a14:useLocalDpi xmlns:a14="http://schemas.microsoft.com/office/drawing/2010/main" val="0"/>
+              </a:ext>
+            </a:extLst>
+          </a:blip>
+          <a:stretch>
+            <a:fillRect/>
+          </a:stretch>
+        </p:blipFill>
+        <p:spPr>
+          <a:xfrm>
+            <a:off x="10538" y="582888"/>
+            <a:ext cx="2095049" cy="792088"/>
+          </a:xfrm>
+          <a:prstGeom prst="rect">
+            <a:avLst/>
+          </a:prstGeom>
+        </p:spPr>
+      </p:pic>
+      <p:sp>
+        <p:nvSpPr>
+          <p:cNvPr id="9" name="8 CuadroTexto"/>
+          <p:cNvSpPr txBox="1"/>
+          <p:nvPr/>
+        </p:nvSpPr>
+        <p:spPr>
+          <a:xfrm>
+            <a:off x="5028163" y="717322"/>
+            <a:ext cx="959878" cy="523220"/>
+          </a:xfrm>
+          <a:prstGeom prst="rect">
+            <a:avLst/>
+          </a:prstGeom>
+          <a:noFill/>
+        </p:spPr>
+        <p:txBody>
+          <a:bodyPr wrap="none" rtlCol="0">
+            <a:spAutoFit/>
+          </a:bodyPr>
+          <a:lstStyle/>
+          <a:p>
+            <a:r>
+              <a:rPr lang="es-ES" sz="2800" dirty="0" smtClean="0"/>
+              <a:t>Lotes</a:t>
+            </a:r>
+            <a:endParaRPr lang="es-ES" sz="2800" dirty="0"/>
+          </a:p>
+        </p:txBody>
+      </p:sp>
+      <p:sp>
+        <p:nvSpPr>
+          <p:cNvPr id="2" name="1 Rectángulo"/>
+          <p:cNvSpPr/>
+          <p:nvPr/>
+        </p:nvSpPr>
+        <p:spPr>
+          <a:xfrm>
+            <a:off x="10538" y="0"/>
+            <a:ext cx="9133462" cy="555526"/>
+          </a:xfrm>
+          <a:prstGeom prst="rect">
+            <a:avLst/>
+          </a:prstGeom>
+          <a:ln>
+            <a:noFill/>
+          </a:ln>
+        </p:spPr>
+        <p:style>
+          <a:lnRef idx="1">
+            <a:schemeClr val="dk1"/>
+          </a:lnRef>
+          <a:fillRef idx="2">
+            <a:schemeClr val="dk1"/>
+          </a:fillRef>
+          <a:effectRef idx="1">
+            <a:schemeClr val="dk1"/>
+          </a:effectRef>
+          <a:fontRef idx="minor">
+            <a:schemeClr val="dk1"/>
+          </a:fontRef>
+        </p:style>
+        <p:txBody>
+          <a:bodyPr rtlCol="0" anchor="ctr"/>
+          <a:lstStyle/>
+          <a:p>
+            <a:pPr algn="ctr"/>
+            <a:endParaRPr lang="es-ES"/>
+          </a:p>
+        </p:txBody>
+      </p:sp>
+      <p:sp>
+        <p:nvSpPr>
+          <p:cNvPr id="3" name="2 Rectángulo"/>
+          <p:cNvSpPr/>
+          <p:nvPr/>
+        </p:nvSpPr>
+        <p:spPr>
+          <a:xfrm>
+            <a:off x="2195736" y="123478"/>
+            <a:ext cx="6120680" cy="288032"/>
+          </a:xfrm>
+          <a:prstGeom prst="rect">
+            <a:avLst/>
+          </a:prstGeom>
+          <a:ln>
+            <a:solidFill>
+              <a:schemeClr val="bg1"/>
+            </a:solidFill>
+          </a:ln>
+        </p:spPr>
+        <p:style>
+          <a:lnRef idx="2">
+            <a:schemeClr val="dk1"/>
+          </a:lnRef>
+          <a:fillRef idx="1">
+            <a:schemeClr val="lt1"/>
+          </a:fillRef>
+          <a:effectRef idx="0">
+            <a:schemeClr val="dk1"/>
+          </a:effectRef>
+          <a:fontRef idx="minor">
+            <a:schemeClr val="dk1"/>
+          </a:fontRef>
+        </p:style>
+        <p:txBody>
+          <a:bodyPr rtlCol="0" anchor="ctr"/>
+          <a:lstStyle/>
+          <a:p>
+            <a:r>
+              <a:rPr lang="es-ES" dirty="0" smtClean="0"/>
+              <a:t>Skyranger.com/lotes/nuevo</a:t>
+            </a:r>
+            <a:endParaRPr lang="es-ES" dirty="0"/>
+          </a:p>
+        </p:txBody>
+      </p:sp>
+      <p:sp>
+        <p:nvSpPr>
+          <p:cNvPr id="7" name="6 CuadroTexto"/>
+          <p:cNvSpPr txBox="1"/>
+          <p:nvPr/>
+        </p:nvSpPr>
+        <p:spPr>
+          <a:xfrm>
+            <a:off x="3057531" y="1346115"/>
+            <a:ext cx="676788" cy="276999"/>
+          </a:xfrm>
+          <a:prstGeom prst="rect">
+            <a:avLst/>
+          </a:prstGeom>
+          <a:noFill/>
+        </p:spPr>
+        <p:txBody>
+          <a:bodyPr wrap="none" rtlCol="0">
+            <a:spAutoFit/>
+          </a:bodyPr>
+          <a:lstStyle/>
+          <a:p>
+            <a:r>
+              <a:rPr lang="es-ES" sz="1200" dirty="0" smtClean="0"/>
+              <a:t>Artículo</a:t>
+            </a:r>
+            <a:endParaRPr lang="es-ES" sz="1200" dirty="0"/>
+          </a:p>
+        </p:txBody>
+      </p:sp>
+      <p:sp>
+        <p:nvSpPr>
+          <p:cNvPr id="19" name="18 Rectángulo"/>
+          <p:cNvSpPr/>
+          <p:nvPr/>
+        </p:nvSpPr>
+        <p:spPr>
+          <a:xfrm>
+            <a:off x="3201547" y="1623114"/>
+            <a:ext cx="1586477" cy="276999"/>
+          </a:xfrm>
+          <a:prstGeom prst="rect">
+            <a:avLst/>
+          </a:prstGeom>
+        </p:spPr>
+        <p:style>
+          <a:lnRef idx="2">
+            <a:schemeClr val="accent1"/>
+          </a:lnRef>
+          <a:fillRef idx="1">
+            <a:schemeClr val="lt1"/>
+          </a:fillRef>
+          <a:effectRef idx="0">
+            <a:schemeClr val="accent1"/>
+          </a:effectRef>
+          <a:fontRef idx="minor">
+            <a:schemeClr val="dk1"/>
+          </a:fontRef>
+        </p:style>
+        <p:txBody>
+          <a:bodyPr rtlCol="0" anchor="ctr"/>
+          <a:lstStyle/>
+          <a:p>
+            <a:r>
+              <a:rPr lang="es-ES" sz="1200" dirty="0" smtClean="0"/>
+              <a:t>SIM</a:t>
+            </a:r>
+            <a:endParaRPr lang="es-ES" sz="1200" dirty="0"/>
+          </a:p>
+        </p:txBody>
+      </p:sp>
+      <p:sp>
+        <p:nvSpPr>
+          <p:cNvPr id="20" name="19 Triángulo isósceles"/>
+          <p:cNvSpPr/>
+          <p:nvPr/>
+        </p:nvSpPr>
+        <p:spPr>
+          <a:xfrm flipV="1">
+            <a:off x="4547881" y="1725609"/>
+            <a:ext cx="96127" cy="72008"/>
+          </a:xfrm>
+          <a:prstGeom prst="triangle">
+            <a:avLst/>
+          </a:prstGeom>
+        </p:spPr>
+        <p:style>
+          <a:lnRef idx="2">
+            <a:schemeClr val="accent1">
+              <a:shade val="50000"/>
+            </a:schemeClr>
+          </a:lnRef>
+          <a:fillRef idx="1">
+            <a:schemeClr val="accent1"/>
+          </a:fillRef>
+          <a:effectRef idx="0">
+            <a:schemeClr val="accent1"/>
+          </a:effectRef>
+          <a:fontRef idx="minor">
+            <a:schemeClr val="lt1"/>
+          </a:fontRef>
+        </p:style>
+        <p:txBody>
+          <a:bodyPr rtlCol="0" anchor="ctr"/>
+          <a:lstStyle/>
+          <a:p>
+            <a:pPr algn="ctr"/>
+            <a:endParaRPr lang="es-ES"/>
+          </a:p>
+        </p:txBody>
+      </p:sp>
+      <p:sp>
+        <p:nvSpPr>
+          <p:cNvPr id="21" name="20 CuadroTexto"/>
+          <p:cNvSpPr txBox="1"/>
+          <p:nvPr/>
+        </p:nvSpPr>
+        <p:spPr>
+          <a:xfrm>
+            <a:off x="5121793" y="1995686"/>
+            <a:ext cx="1250407" cy="276999"/>
+          </a:xfrm>
+          <a:prstGeom prst="rect">
+            <a:avLst/>
+          </a:prstGeom>
+          <a:noFill/>
+        </p:spPr>
+        <p:txBody>
+          <a:bodyPr wrap="none" rtlCol="0">
+            <a:spAutoFit/>
+          </a:bodyPr>
+          <a:lstStyle/>
+          <a:p>
+            <a:r>
+              <a:rPr lang="es-ES" sz="1200" dirty="0" smtClean="0"/>
+              <a:t>Fecha de compra</a:t>
+            </a:r>
+            <a:endParaRPr lang="es-ES" sz="1200" dirty="0"/>
+          </a:p>
+        </p:txBody>
+      </p:sp>
+      <p:sp>
+        <p:nvSpPr>
+          <p:cNvPr id="22" name="21 Rectángulo"/>
+          <p:cNvSpPr/>
+          <p:nvPr/>
+        </p:nvSpPr>
+        <p:spPr>
+          <a:xfrm>
+            <a:off x="5239432" y="2283718"/>
+            <a:ext cx="1492808" cy="276999"/>
+          </a:xfrm>
+          <a:prstGeom prst="rect">
+            <a:avLst/>
+          </a:prstGeom>
+        </p:spPr>
+        <p:style>
+          <a:lnRef idx="2">
+            <a:schemeClr val="accent1"/>
+          </a:lnRef>
+          <a:fillRef idx="1">
+            <a:schemeClr val="lt1"/>
+          </a:fillRef>
+          <a:effectRef idx="0">
+            <a:schemeClr val="accent1"/>
+          </a:effectRef>
+          <a:fontRef idx="minor">
+            <a:schemeClr val="dk1"/>
+          </a:fontRef>
+        </p:style>
+        <p:txBody>
+          <a:bodyPr rtlCol="0" anchor="ctr"/>
+          <a:lstStyle/>
+          <a:p>
+            <a:endParaRPr lang="es-ES" sz="1200" dirty="0"/>
+          </a:p>
+        </p:txBody>
+      </p:sp>
+      <p:sp>
+        <p:nvSpPr>
+          <p:cNvPr id="23" name="22 Rectángulo"/>
+          <p:cNvSpPr/>
+          <p:nvPr/>
+        </p:nvSpPr>
+        <p:spPr>
+          <a:xfrm>
+            <a:off x="6516216" y="2355726"/>
+            <a:ext cx="144016" cy="138499"/>
+          </a:xfrm>
+          <a:prstGeom prst="rect">
+            <a:avLst/>
+          </a:prstGeom>
+        </p:spPr>
+        <p:style>
+          <a:lnRef idx="2">
+            <a:schemeClr val="accent1">
+              <a:shade val="50000"/>
+            </a:schemeClr>
+          </a:lnRef>
+          <a:fillRef idx="1">
+            <a:schemeClr val="accent1"/>
+          </a:fillRef>
+          <a:effectRef idx="0">
+            <a:schemeClr val="accent1"/>
+          </a:effectRef>
+          <a:fontRef idx="minor">
+            <a:schemeClr val="lt1"/>
+          </a:fontRef>
+        </p:style>
+        <p:txBody>
+          <a:bodyPr rtlCol="0" anchor="ctr"/>
+          <a:lstStyle/>
+          <a:p>
+            <a:pPr algn="ctr"/>
+            <a:endParaRPr lang="es-ES"/>
+          </a:p>
+        </p:txBody>
+      </p:sp>
+      <p:sp>
+        <p:nvSpPr>
+          <p:cNvPr id="24" name="23 CuadroTexto"/>
+          <p:cNvSpPr txBox="1"/>
+          <p:nvPr/>
+        </p:nvSpPr>
+        <p:spPr>
+          <a:xfrm>
+            <a:off x="6953420" y="1995686"/>
+            <a:ext cx="1406475" cy="276999"/>
+          </a:xfrm>
+          <a:prstGeom prst="rect">
+            <a:avLst/>
+          </a:prstGeom>
+          <a:noFill/>
+        </p:spPr>
+        <p:txBody>
+          <a:bodyPr wrap="none" rtlCol="0">
+            <a:spAutoFit/>
+          </a:bodyPr>
+          <a:lstStyle/>
+          <a:p>
+            <a:r>
+              <a:rPr lang="es-ES" sz="1200" dirty="0" smtClean="0"/>
+              <a:t>Fecha de activación</a:t>
+            </a:r>
+            <a:endParaRPr lang="es-ES" sz="1200" dirty="0"/>
+          </a:p>
+        </p:txBody>
+      </p:sp>
+      <p:sp>
+        <p:nvSpPr>
+          <p:cNvPr id="25" name="24 Rectángulo"/>
+          <p:cNvSpPr/>
+          <p:nvPr/>
+        </p:nvSpPr>
+        <p:spPr>
+          <a:xfrm>
+            <a:off x="7054990" y="2283718"/>
+            <a:ext cx="1549457" cy="276999"/>
+          </a:xfrm>
+          <a:prstGeom prst="rect">
+            <a:avLst/>
+          </a:prstGeom>
+        </p:spPr>
+        <p:style>
+          <a:lnRef idx="2">
+            <a:schemeClr val="accent1"/>
+          </a:lnRef>
+          <a:fillRef idx="1">
+            <a:schemeClr val="lt1"/>
+          </a:fillRef>
+          <a:effectRef idx="0">
+            <a:schemeClr val="accent1"/>
+          </a:effectRef>
+          <a:fontRef idx="minor">
+            <a:schemeClr val="dk1"/>
+          </a:fontRef>
+        </p:style>
+        <p:txBody>
+          <a:bodyPr rtlCol="0" anchor="ctr"/>
+          <a:lstStyle/>
+          <a:p>
+            <a:endParaRPr lang="es-ES" sz="1200" dirty="0"/>
+          </a:p>
+        </p:txBody>
+      </p:sp>
+      <p:sp>
+        <p:nvSpPr>
+          <p:cNvPr id="26" name="25 Rectángulo"/>
+          <p:cNvSpPr/>
+          <p:nvPr/>
+        </p:nvSpPr>
+        <p:spPr>
+          <a:xfrm>
+            <a:off x="8388424" y="2355726"/>
+            <a:ext cx="144016" cy="138499"/>
+          </a:xfrm>
+          <a:prstGeom prst="rect">
+            <a:avLst/>
+          </a:prstGeom>
+        </p:spPr>
+        <p:style>
+          <a:lnRef idx="2">
+            <a:schemeClr val="accent1">
+              <a:shade val="50000"/>
+            </a:schemeClr>
+          </a:lnRef>
+          <a:fillRef idx="1">
+            <a:schemeClr val="accent1"/>
+          </a:fillRef>
+          <a:effectRef idx="0">
+            <a:schemeClr val="accent1"/>
+          </a:effectRef>
+          <a:fontRef idx="minor">
+            <a:schemeClr val="lt1"/>
+          </a:fontRef>
+        </p:style>
+        <p:txBody>
+          <a:bodyPr rtlCol="0" anchor="ctr"/>
+          <a:lstStyle/>
+          <a:p>
+            <a:pPr algn="ctr"/>
+            <a:endParaRPr lang="es-ES"/>
+          </a:p>
+        </p:txBody>
+      </p:sp>
+      <p:sp>
+        <p:nvSpPr>
+          <p:cNvPr id="27" name="26 CuadroTexto"/>
+          <p:cNvSpPr txBox="1"/>
+          <p:nvPr/>
+        </p:nvSpPr>
+        <p:spPr>
+          <a:xfrm>
+            <a:off x="3995936" y="3446879"/>
+            <a:ext cx="912494" cy="276999"/>
+          </a:xfrm>
+          <a:prstGeom prst="rect">
+            <a:avLst/>
+          </a:prstGeom>
+          <a:noFill/>
+        </p:spPr>
+        <p:txBody>
+          <a:bodyPr wrap="none" rtlCol="0">
+            <a:spAutoFit/>
+          </a:bodyPr>
+          <a:lstStyle/>
+          <a:p>
+            <a:r>
+              <a:rPr lang="es-ES" sz="1200" dirty="0" smtClean="0"/>
+              <a:t>Precio Total</a:t>
+            </a:r>
+            <a:endParaRPr lang="es-ES" sz="1200" dirty="0"/>
+          </a:p>
+        </p:txBody>
+      </p:sp>
+      <p:sp>
+        <p:nvSpPr>
+          <p:cNvPr id="28" name="27 Rectángulo"/>
+          <p:cNvSpPr/>
+          <p:nvPr/>
+        </p:nvSpPr>
+        <p:spPr>
+          <a:xfrm>
+            <a:off x="4079418" y="3734911"/>
+            <a:ext cx="1561122" cy="276999"/>
+          </a:xfrm>
+          <a:prstGeom prst="rect">
+            <a:avLst/>
+          </a:prstGeom>
+        </p:spPr>
+        <p:style>
+          <a:lnRef idx="2">
+            <a:schemeClr val="accent1"/>
+          </a:lnRef>
+          <a:fillRef idx="1">
+            <a:schemeClr val="lt1"/>
+          </a:fillRef>
+          <a:effectRef idx="0">
+            <a:schemeClr val="accent1"/>
+          </a:effectRef>
+          <a:fontRef idx="minor">
+            <a:schemeClr val="dk1"/>
+          </a:fontRef>
+        </p:style>
+        <p:txBody>
+          <a:bodyPr rtlCol="0" anchor="ctr"/>
+          <a:lstStyle/>
+          <a:p>
+            <a:endParaRPr lang="es-ES" sz="1200" dirty="0"/>
+          </a:p>
+        </p:txBody>
+      </p:sp>
+      <p:sp>
+        <p:nvSpPr>
+          <p:cNvPr id="29" name="28 CuadroTexto"/>
+          <p:cNvSpPr txBox="1"/>
+          <p:nvPr/>
+        </p:nvSpPr>
+        <p:spPr>
+          <a:xfrm>
+            <a:off x="6156178" y="3468817"/>
+            <a:ext cx="1118511" cy="276999"/>
+          </a:xfrm>
+          <a:prstGeom prst="rect">
+            <a:avLst/>
+          </a:prstGeom>
+          <a:noFill/>
+        </p:spPr>
+        <p:txBody>
+          <a:bodyPr wrap="none" rtlCol="0">
+            <a:spAutoFit/>
+          </a:bodyPr>
+          <a:lstStyle/>
+          <a:p>
+            <a:r>
+              <a:rPr lang="es-ES" sz="1200" dirty="0" smtClean="0"/>
+              <a:t>Precio Unitario</a:t>
+            </a:r>
+            <a:endParaRPr lang="es-ES" sz="1200" dirty="0"/>
+          </a:p>
+        </p:txBody>
+      </p:sp>
+      <p:sp>
+        <p:nvSpPr>
+          <p:cNvPr id="30" name="29 Rectángulo"/>
+          <p:cNvSpPr/>
+          <p:nvPr/>
+        </p:nvSpPr>
+        <p:spPr>
+          <a:xfrm>
+            <a:off x="6228185" y="3723878"/>
+            <a:ext cx="1512167" cy="276999"/>
+          </a:xfrm>
+          <a:prstGeom prst="rect">
+            <a:avLst/>
+          </a:prstGeom>
+        </p:spPr>
+        <p:style>
+          <a:lnRef idx="2">
+            <a:schemeClr val="accent1"/>
+          </a:lnRef>
+          <a:fillRef idx="1">
+            <a:schemeClr val="lt1"/>
+          </a:fillRef>
+          <a:effectRef idx="0">
+            <a:schemeClr val="accent1"/>
+          </a:effectRef>
+          <a:fontRef idx="minor">
+            <a:schemeClr val="dk1"/>
+          </a:fontRef>
+        </p:style>
+        <p:txBody>
+          <a:bodyPr rtlCol="0" anchor="ctr"/>
+          <a:lstStyle/>
+          <a:p>
+            <a:endParaRPr lang="es-ES" sz="1200" dirty="0"/>
+          </a:p>
+        </p:txBody>
+      </p:sp>
+      <p:sp>
+        <p:nvSpPr>
+          <p:cNvPr id="33" name="32 CuadroTexto"/>
+          <p:cNvSpPr txBox="1"/>
+          <p:nvPr/>
+        </p:nvSpPr>
+        <p:spPr>
+          <a:xfrm>
+            <a:off x="3081407" y="1995905"/>
+            <a:ext cx="832407" cy="276999"/>
+          </a:xfrm>
+          <a:prstGeom prst="rect">
+            <a:avLst/>
+          </a:prstGeom>
+          <a:noFill/>
+        </p:spPr>
+        <p:txBody>
+          <a:bodyPr wrap="none" rtlCol="0">
+            <a:spAutoFit/>
+          </a:bodyPr>
+          <a:lstStyle/>
+          <a:p>
+            <a:r>
+              <a:rPr lang="es-ES" sz="1200" dirty="0" smtClean="0"/>
+              <a:t>Proveedor</a:t>
+            </a:r>
+            <a:endParaRPr lang="es-ES" sz="1200" dirty="0"/>
+          </a:p>
+        </p:txBody>
+      </p:sp>
+      <p:sp>
+        <p:nvSpPr>
+          <p:cNvPr id="34" name="33 Rectángulo"/>
+          <p:cNvSpPr/>
+          <p:nvPr/>
+        </p:nvSpPr>
+        <p:spPr>
+          <a:xfrm>
+            <a:off x="3225422" y="2294751"/>
+            <a:ext cx="1562602" cy="276999"/>
+          </a:xfrm>
+          <a:prstGeom prst="rect">
+            <a:avLst/>
+          </a:prstGeom>
+        </p:spPr>
+        <p:style>
+          <a:lnRef idx="2">
+            <a:schemeClr val="accent1"/>
+          </a:lnRef>
+          <a:fillRef idx="1">
+            <a:schemeClr val="lt1"/>
+          </a:fillRef>
+          <a:effectRef idx="0">
+            <a:schemeClr val="accent1"/>
+          </a:effectRef>
+          <a:fontRef idx="minor">
+            <a:schemeClr val="dk1"/>
+          </a:fontRef>
+        </p:style>
+        <p:txBody>
+          <a:bodyPr rtlCol="0" anchor="ctr"/>
+          <a:lstStyle/>
+          <a:p>
+            <a:r>
+              <a:rPr lang="es-ES" sz="1200" dirty="0" smtClean="0"/>
+              <a:t>Claro</a:t>
+            </a:r>
+            <a:endParaRPr lang="es-ES" sz="1200" dirty="0"/>
+          </a:p>
+        </p:txBody>
+      </p:sp>
+      <p:sp>
+        <p:nvSpPr>
+          <p:cNvPr id="35" name="34 Triángulo isósceles"/>
+          <p:cNvSpPr/>
+          <p:nvPr/>
+        </p:nvSpPr>
+        <p:spPr>
+          <a:xfrm flipV="1">
+            <a:off x="4547881" y="2397246"/>
+            <a:ext cx="96127" cy="72008"/>
+          </a:xfrm>
+          <a:prstGeom prst="triangle">
+            <a:avLst/>
+          </a:prstGeom>
+        </p:spPr>
+        <p:style>
+          <a:lnRef idx="2">
+            <a:schemeClr val="accent1">
+              <a:shade val="50000"/>
+            </a:schemeClr>
+          </a:lnRef>
+          <a:fillRef idx="1">
+            <a:schemeClr val="accent1"/>
+          </a:fillRef>
+          <a:effectRef idx="0">
+            <a:schemeClr val="accent1"/>
+          </a:effectRef>
+          <a:fontRef idx="minor">
+            <a:schemeClr val="lt1"/>
+          </a:fontRef>
+        </p:style>
+        <p:txBody>
+          <a:bodyPr rtlCol="0" anchor="ctr"/>
+          <a:lstStyle/>
+          <a:p>
+            <a:pPr algn="ctr"/>
+            <a:endParaRPr lang="es-ES"/>
+          </a:p>
+        </p:txBody>
+      </p:sp>
+      <p:sp>
+        <p:nvSpPr>
+          <p:cNvPr id="37" name="36 Rectángulo"/>
+          <p:cNvSpPr/>
+          <p:nvPr/>
+        </p:nvSpPr>
+        <p:spPr>
+          <a:xfrm>
+            <a:off x="6300190" y="4299942"/>
+            <a:ext cx="1457004" cy="504056"/>
+          </a:xfrm>
+          <a:prstGeom prst="rect">
+            <a:avLst/>
+          </a:prstGeom>
+        </p:spPr>
+        <p:style>
+          <a:lnRef idx="0">
+            <a:schemeClr val="accent1"/>
+          </a:lnRef>
+          <a:fillRef idx="3">
+            <a:schemeClr val="accent1"/>
+          </a:fillRef>
+          <a:effectRef idx="3">
+            <a:schemeClr val="accent1"/>
+          </a:effectRef>
+          <a:fontRef idx="minor">
+            <a:schemeClr val="lt1"/>
+          </a:fontRef>
+        </p:style>
+        <p:txBody>
+          <a:bodyPr rtlCol="0" anchor="ctr"/>
+          <a:lstStyle/>
+          <a:p>
+            <a:pPr algn="ctr"/>
+            <a:r>
+              <a:rPr lang="es-ES" dirty="0" smtClean="0"/>
+              <a:t>Siguiente</a:t>
+            </a:r>
+            <a:endParaRPr lang="es-ES" dirty="0"/>
+          </a:p>
+        </p:txBody>
+      </p:sp>
+      <p:sp>
+        <p:nvSpPr>
+          <p:cNvPr id="39" name="38 Rectángulo"/>
+          <p:cNvSpPr/>
+          <p:nvPr/>
+        </p:nvSpPr>
+        <p:spPr>
+          <a:xfrm>
+            <a:off x="3693708" y="4299942"/>
+            <a:ext cx="1457004" cy="504056"/>
+          </a:xfrm>
+          <a:prstGeom prst="rect">
+            <a:avLst/>
+          </a:prstGeom>
+        </p:spPr>
+        <p:style>
+          <a:lnRef idx="0">
+            <a:schemeClr val="accent2"/>
+          </a:lnRef>
+          <a:fillRef idx="3">
+            <a:schemeClr val="accent2"/>
+          </a:fillRef>
+          <a:effectRef idx="3">
+            <a:schemeClr val="accent2"/>
+          </a:effectRef>
+          <a:fontRef idx="minor">
+            <a:schemeClr val="lt1"/>
+          </a:fontRef>
+        </p:style>
+        <p:txBody>
+          <a:bodyPr rtlCol="0" anchor="ctr"/>
+          <a:lstStyle/>
+          <a:p>
+            <a:pPr algn="ctr"/>
+            <a:r>
+              <a:rPr lang="es-ES" dirty="0" smtClean="0"/>
+              <a:t>Cancelar</a:t>
+            </a:r>
+            <a:endParaRPr lang="es-ES" dirty="0"/>
+          </a:p>
+        </p:txBody>
+      </p:sp>
+      <p:sp>
+        <p:nvSpPr>
+          <p:cNvPr id="40" name="39 CuadroTexto"/>
+          <p:cNvSpPr txBox="1"/>
+          <p:nvPr/>
+        </p:nvSpPr>
+        <p:spPr>
+          <a:xfrm>
+            <a:off x="3138182" y="2715766"/>
+            <a:ext cx="578685" cy="276999"/>
+          </a:xfrm>
+          <a:prstGeom prst="rect">
+            <a:avLst/>
+          </a:prstGeom>
+          <a:noFill/>
+        </p:spPr>
+        <p:txBody>
+          <a:bodyPr wrap="none" rtlCol="0">
+            <a:spAutoFit/>
+          </a:bodyPr>
+          <a:lstStyle/>
+          <a:p>
+            <a:r>
+              <a:rPr lang="es-ES" sz="1200" dirty="0" smtClean="0"/>
+              <a:t>Marca</a:t>
+            </a:r>
+            <a:endParaRPr lang="es-ES" sz="1200" dirty="0"/>
+          </a:p>
+        </p:txBody>
+      </p:sp>
+      <p:sp>
+        <p:nvSpPr>
+          <p:cNvPr id="41" name="40 Rectángulo"/>
+          <p:cNvSpPr/>
+          <p:nvPr/>
+        </p:nvSpPr>
+        <p:spPr>
+          <a:xfrm>
+            <a:off x="3226902" y="3001255"/>
+            <a:ext cx="1561122" cy="276999"/>
+          </a:xfrm>
+          <a:prstGeom prst="rect">
+            <a:avLst/>
+          </a:prstGeom>
+        </p:spPr>
+        <p:style>
+          <a:lnRef idx="2">
+            <a:schemeClr val="accent1"/>
+          </a:lnRef>
+          <a:fillRef idx="1">
+            <a:schemeClr val="lt1"/>
+          </a:fillRef>
+          <a:effectRef idx="0">
+            <a:schemeClr val="accent1"/>
+          </a:effectRef>
+          <a:fontRef idx="minor">
+            <a:schemeClr val="dk1"/>
+          </a:fontRef>
+        </p:style>
+        <p:txBody>
+          <a:bodyPr rtlCol="0" anchor="ctr"/>
+          <a:lstStyle/>
+          <a:p>
+            <a:endParaRPr lang="es-ES" sz="1200" dirty="0"/>
+          </a:p>
+        </p:txBody>
+      </p:sp>
+      <p:sp>
+        <p:nvSpPr>
+          <p:cNvPr id="42" name="41 Triángulo isósceles"/>
+          <p:cNvSpPr/>
+          <p:nvPr/>
+        </p:nvSpPr>
+        <p:spPr>
+          <a:xfrm flipV="1">
+            <a:off x="4619889" y="3139481"/>
+            <a:ext cx="96127" cy="72008"/>
+          </a:xfrm>
+          <a:prstGeom prst="triangle">
+            <a:avLst/>
+          </a:prstGeom>
+        </p:spPr>
+        <p:style>
+          <a:lnRef idx="2">
+            <a:schemeClr val="accent1">
+              <a:shade val="50000"/>
+            </a:schemeClr>
+          </a:lnRef>
+          <a:fillRef idx="1">
+            <a:schemeClr val="accent1"/>
+          </a:fillRef>
+          <a:effectRef idx="0">
+            <a:schemeClr val="accent1"/>
+          </a:effectRef>
+          <a:fontRef idx="minor">
+            <a:schemeClr val="lt1"/>
+          </a:fontRef>
+        </p:style>
+        <p:txBody>
+          <a:bodyPr rtlCol="0" anchor="ctr"/>
+          <a:lstStyle/>
+          <a:p>
+            <a:pPr algn="ctr"/>
+            <a:endParaRPr lang="es-ES"/>
+          </a:p>
+        </p:txBody>
+      </p:sp>
+      <p:sp>
+        <p:nvSpPr>
+          <p:cNvPr id="43" name="42 CuadroTexto"/>
+          <p:cNvSpPr txBox="1"/>
+          <p:nvPr/>
+        </p:nvSpPr>
+        <p:spPr>
+          <a:xfrm>
+            <a:off x="5150712" y="2729342"/>
+            <a:ext cx="671979" cy="276999"/>
+          </a:xfrm>
+          <a:prstGeom prst="rect">
+            <a:avLst/>
+          </a:prstGeom>
+          <a:noFill/>
+        </p:spPr>
+        <p:txBody>
+          <a:bodyPr wrap="none" rtlCol="0">
+            <a:spAutoFit/>
+          </a:bodyPr>
+          <a:lstStyle/>
+          <a:p>
+            <a:r>
+              <a:rPr lang="es-ES" sz="1200" dirty="0" smtClean="0"/>
+              <a:t>Modelo</a:t>
+            </a:r>
+            <a:endParaRPr lang="es-ES" sz="1200" dirty="0"/>
+          </a:p>
+        </p:txBody>
+      </p:sp>
+      <p:sp>
+        <p:nvSpPr>
+          <p:cNvPr id="44" name="43 Rectángulo"/>
+          <p:cNvSpPr/>
+          <p:nvPr/>
+        </p:nvSpPr>
+        <p:spPr>
+          <a:xfrm>
+            <a:off x="5239432" y="3003798"/>
+            <a:ext cx="1492808" cy="276999"/>
+          </a:xfrm>
+          <a:prstGeom prst="rect">
+            <a:avLst/>
+          </a:prstGeom>
+        </p:spPr>
+        <p:style>
+          <a:lnRef idx="2">
+            <a:schemeClr val="accent1"/>
+          </a:lnRef>
+          <a:fillRef idx="1">
+            <a:schemeClr val="lt1"/>
+          </a:fillRef>
+          <a:effectRef idx="0">
+            <a:schemeClr val="accent1"/>
+          </a:effectRef>
+          <a:fontRef idx="minor">
+            <a:schemeClr val="dk1"/>
+          </a:fontRef>
+        </p:style>
+        <p:txBody>
+          <a:bodyPr rtlCol="0" anchor="ctr"/>
+          <a:lstStyle/>
+          <a:p>
+            <a:endParaRPr lang="es-ES" sz="1200" dirty="0"/>
+          </a:p>
+        </p:txBody>
+      </p:sp>
+      <p:sp>
+        <p:nvSpPr>
+          <p:cNvPr id="45" name="44 Triángulo isósceles"/>
+          <p:cNvSpPr/>
+          <p:nvPr/>
+        </p:nvSpPr>
+        <p:spPr>
+          <a:xfrm flipV="1">
+            <a:off x="6564105" y="3147814"/>
+            <a:ext cx="96127" cy="72008"/>
+          </a:xfrm>
+          <a:prstGeom prst="triangle">
+            <a:avLst/>
+          </a:prstGeom>
+        </p:spPr>
+        <p:style>
+          <a:lnRef idx="2">
+            <a:schemeClr val="accent1">
+              <a:shade val="50000"/>
+            </a:schemeClr>
+          </a:lnRef>
+          <a:fillRef idx="1">
+            <a:schemeClr val="accent1"/>
+          </a:fillRef>
+          <a:effectRef idx="0">
+            <a:schemeClr val="accent1"/>
+          </a:effectRef>
+          <a:fontRef idx="minor">
+            <a:schemeClr val="lt1"/>
+          </a:fontRef>
+        </p:style>
+        <p:txBody>
+          <a:bodyPr rtlCol="0" anchor="ctr"/>
+          <a:lstStyle/>
+          <a:p>
+            <a:pPr algn="ctr"/>
+            <a:endParaRPr lang="es-ES"/>
+          </a:p>
+        </p:txBody>
+      </p:sp>
+      <p:sp>
+        <p:nvSpPr>
+          <p:cNvPr id="46" name="45 CuadroTexto"/>
+          <p:cNvSpPr txBox="1"/>
+          <p:nvPr/>
+        </p:nvSpPr>
+        <p:spPr>
+          <a:xfrm>
+            <a:off x="7020272" y="2715766"/>
+            <a:ext cx="453970" cy="276999"/>
+          </a:xfrm>
+          <a:prstGeom prst="rect">
+            <a:avLst/>
+          </a:prstGeom>
+          <a:noFill/>
+        </p:spPr>
+        <p:txBody>
+          <a:bodyPr wrap="none" rtlCol="0">
+            <a:spAutoFit/>
+          </a:bodyPr>
+          <a:lstStyle/>
+          <a:p>
+            <a:r>
+              <a:rPr lang="es-ES" sz="1200" dirty="0" smtClean="0"/>
+              <a:t>APN</a:t>
+            </a:r>
+            <a:endParaRPr lang="es-ES" sz="1200" dirty="0"/>
+          </a:p>
+        </p:txBody>
+      </p:sp>
+      <p:sp>
+        <p:nvSpPr>
+          <p:cNvPr id="47" name="46 Rectángulo"/>
+          <p:cNvSpPr/>
+          <p:nvPr/>
+        </p:nvSpPr>
+        <p:spPr>
+          <a:xfrm>
+            <a:off x="7075227" y="3003798"/>
+            <a:ext cx="1529220" cy="276999"/>
+          </a:xfrm>
+          <a:prstGeom prst="rect">
+            <a:avLst/>
+          </a:prstGeom>
+        </p:spPr>
+        <p:style>
+          <a:lnRef idx="2">
+            <a:schemeClr val="accent1"/>
+          </a:lnRef>
+          <a:fillRef idx="1">
+            <a:schemeClr val="lt1"/>
+          </a:fillRef>
+          <a:effectRef idx="0">
+            <a:schemeClr val="accent1"/>
+          </a:effectRef>
+          <a:fontRef idx="minor">
+            <a:schemeClr val="dk1"/>
+          </a:fontRef>
+        </p:style>
+        <p:txBody>
+          <a:bodyPr rtlCol="0" anchor="ctr"/>
+          <a:lstStyle/>
+          <a:p>
+            <a:endParaRPr lang="es-ES" sz="1200" dirty="0"/>
+          </a:p>
+        </p:txBody>
+      </p:sp>
+    </p:spTree>
+    <p:extLst>
+      <p:ext uri="{BB962C8B-B14F-4D97-AF65-F5344CB8AC3E}">
+        <p14:creationId xmlns:p14="http://schemas.microsoft.com/office/powerpoint/2010/main" val="2833032332"/>
+      </p:ext>
+    </p:extLst>
+  </p:cSld>
+  <p:clrMapOvr>
+    <a:masterClrMapping/>
+  </p:clrMapOvr>
+</p:sld>
+</file>
+
+<file path=ppt/slides/slide4.xml><?xml version="1.0" encoding="utf-8"?>
+<p:sld xmlns:a="http://schemas.openxmlformats.org/drawingml/2006/main" xmlns:r="http://schemas.openxmlformats.org/officeDocument/2006/relationships" xmlns:p="http://schemas.openxmlformats.org/presentationml/2006/main">
+  <p:cSld>
+    <p:spTree>
+      <p:nvGrpSpPr>
+        <p:cNvPr id="1" name=""/>
+        <p:cNvGrpSpPr/>
+        <p:nvPr/>
+      </p:nvGrpSpPr>
+      <p:grpSpPr>
+        <a:xfrm>
+          <a:off x="0" y="0"/>
+          <a:ext cx="0" cy="0"/>
+          <a:chOff x="0" y="0"/>
+          <a:chExt cx="0" cy="0"/>
+        </a:xfrm>
+      </p:grpSpPr>
+      <p:graphicFrame>
+        <p:nvGraphicFramePr>
+          <p:cNvPr id="5" name="4 Tabla"/>
+          <p:cNvGraphicFramePr>
+            <a:graphicFrameLocks noGrp="1"/>
+          </p:cNvGraphicFramePr>
+          <p:nvPr>
+            <p:extLst>
+              <p:ext uri="{D42A27DB-BD31-4B8C-83A1-F6EECF244321}">
+                <p14:modId xmlns:p14="http://schemas.microsoft.com/office/powerpoint/2010/main" val="12595214"/>
+              </p:ext>
+            </p:extLst>
+          </p:nvPr>
+        </p:nvGraphicFramePr>
+        <p:xfrm>
+          <a:off x="10538" y="608910"/>
+          <a:ext cx="2195736" cy="4501743"/>
+        </p:xfrm>
+        <a:graphic>
+          <a:graphicData uri="http://schemas.openxmlformats.org/drawingml/2006/table">
+            <a:tbl>
+              <a:tblPr firstRow="1" bandRow="1">
+                <a:tableStyleId>{2D5ABB26-0587-4C30-8999-92F81FD0307C}</a:tableStyleId>
+              </a:tblPr>
+              <a:tblGrid>
+                <a:gridCol w="2195736"/>
+              </a:tblGrid>
+              <a:tr h="757743">
+                <a:tc>
+                  <a:txBody>
+                    <a:bodyPr/>
+                    <a:lstStyle/>
+                    <a:p>
+                      <a:endParaRPr lang="es-ES" dirty="0"/>
+                    </a:p>
+                  </a:txBody>
+                  <a:tcPr>
+                    <a:lnL w="12700" cap="flat" cmpd="sng" algn="ctr">
+                      <a:solidFill>
+                        <a:schemeClr val="tx1"/>
+                      </a:solidFill>
+                      <a:prstDash val="solid"/>
+                      <a:round/>
+                      <a:headEnd type="none" w="med" len="med"/>
+                      <a:tailEnd type="none" w="med" len="med"/>
+                    </a:lnL>
+                    <a:lnR w="12700" cap="flat" cmpd="sng" algn="ctr">
+                      <a:solidFill>
+                        <a:schemeClr val="tx1"/>
+                      </a:solidFill>
+                      <a:prstDash val="solid"/>
+                      <a:round/>
+                      <a:headEnd type="none" w="med" len="med"/>
+                      <a:tailEnd type="none" w="med" len="med"/>
+                    </a:lnR>
+                    <a:lnT w="12700" cap="flat" cmpd="sng" algn="ctr">
+                      <a:solidFill>
+                        <a:schemeClr val="tx1"/>
+                      </a:solidFill>
+                      <a:prstDash val="solid"/>
+                      <a:round/>
+                      <a:headEnd type="none" w="med" len="med"/>
+                      <a:tailEnd type="none" w="med" len="med"/>
+                    </a:lnT>
+                    <a:lnB w="12700" cap="flat" cmpd="sng" algn="ctr">
+                      <a:solidFill>
+                        <a:schemeClr val="tx1"/>
+                      </a:solidFill>
+                      <a:prstDash val="solid"/>
+                      <a:round/>
+                      <a:headEnd type="none" w="med" len="med"/>
+                      <a:tailEnd type="none" w="med" len="med"/>
+                    </a:lnB>
+                  </a:tcPr>
+                </a:tc>
+              </a:tr>
+              <a:tr h="468000">
+                <a:tc>
+                  <a:txBody>
+                    <a:bodyPr/>
+                    <a:lstStyle/>
+                    <a:p>
+                      <a:r>
+                        <a:rPr lang="es-ES" sz="1600" dirty="0" smtClean="0"/>
+                        <a:t>Inicio</a:t>
+                      </a:r>
+                      <a:endParaRPr lang="es-ES" sz="1600" dirty="0"/>
+                    </a:p>
+                  </a:txBody>
+                  <a:tcPr anchor="ctr">
+                    <a:lnL w="12700" cap="flat" cmpd="sng" algn="ctr">
+                      <a:solidFill>
+                        <a:schemeClr val="tx1"/>
+                      </a:solidFill>
+                      <a:prstDash val="solid"/>
+                      <a:round/>
+                      <a:headEnd type="none" w="med" len="med"/>
+                      <a:tailEnd type="none" w="med" len="med"/>
+                    </a:lnL>
+                    <a:lnR w="12700" cap="flat" cmpd="sng" algn="ctr">
+                      <a:solidFill>
+                        <a:schemeClr val="tx1"/>
+                      </a:solidFill>
+                      <a:prstDash val="solid"/>
+                      <a:round/>
+                      <a:headEnd type="none" w="med" len="med"/>
+                      <a:tailEnd type="none" w="med" len="med"/>
+                    </a:lnR>
+                    <a:lnT w="12700" cap="flat" cmpd="sng" algn="ctr">
+                      <a:solidFill>
+                        <a:schemeClr val="tx1"/>
+                      </a:solidFill>
+                      <a:prstDash val="solid"/>
+                      <a:round/>
+                      <a:headEnd type="none" w="med" len="med"/>
+                      <a:tailEnd type="none" w="med" len="med"/>
+                    </a:lnT>
+                    <a:lnB w="12700" cap="flat" cmpd="sng" algn="ctr">
+                      <a:solidFill>
+                        <a:schemeClr val="tx1"/>
+                      </a:solidFill>
+                      <a:prstDash val="solid"/>
+                      <a:round/>
+                      <a:headEnd type="none" w="med" len="med"/>
+                      <a:tailEnd type="none" w="med" len="med"/>
+                    </a:lnB>
+                  </a:tcPr>
+                </a:tc>
+              </a:tr>
+              <a:tr h="468000">
+                <a:tc>
+                  <a:txBody>
+                    <a:bodyPr/>
+                    <a:lstStyle/>
+                    <a:p>
+                      <a:r>
+                        <a:rPr lang="es-ES" sz="1600" dirty="0" smtClean="0">
+                          <a:solidFill>
+                            <a:schemeClr val="tx1"/>
+                          </a:solidFill>
+                        </a:rPr>
+                        <a:t>Proveedores</a:t>
+                      </a:r>
+                      <a:endParaRPr lang="es-ES" sz="1600" dirty="0">
+                        <a:solidFill>
+                          <a:schemeClr val="tx1"/>
+                        </a:solidFill>
+                      </a:endParaRPr>
+                    </a:p>
+                  </a:txBody>
+                  <a:tcPr anchor="ctr">
+                    <a:lnL w="12700" cap="flat" cmpd="sng" algn="ctr">
+                      <a:solidFill>
+                        <a:schemeClr val="tx1"/>
+                      </a:solidFill>
+                      <a:prstDash val="solid"/>
+                      <a:round/>
+                      <a:headEnd type="none" w="med" len="med"/>
+                      <a:tailEnd type="none" w="med" len="med"/>
+                    </a:lnL>
+                    <a:lnR w="12700" cap="flat" cmpd="sng" algn="ctr">
+                      <a:solidFill>
+                        <a:schemeClr val="tx1"/>
+                      </a:solidFill>
+                      <a:prstDash val="solid"/>
+                      <a:round/>
+                      <a:headEnd type="none" w="med" len="med"/>
+                      <a:tailEnd type="none" w="med" len="med"/>
+                    </a:lnR>
+                    <a:lnT w="12700" cap="flat" cmpd="sng" algn="ctr">
+                      <a:solidFill>
+                        <a:schemeClr val="tx1"/>
+                      </a:solidFill>
+                      <a:prstDash val="solid"/>
+                      <a:round/>
+                      <a:headEnd type="none" w="med" len="med"/>
+                      <a:tailEnd type="none" w="med" len="med"/>
+                    </a:lnT>
+                    <a:lnB w="12700" cap="flat" cmpd="sng" algn="ctr">
+                      <a:solidFill>
+                        <a:schemeClr val="tx1"/>
+                      </a:solidFill>
+                      <a:prstDash val="solid"/>
+                      <a:round/>
+                      <a:headEnd type="none" w="med" len="med"/>
+                      <a:tailEnd type="none" w="med" len="med"/>
+                    </a:lnB>
+                    <a:noFill/>
+                  </a:tcPr>
+                </a:tc>
+              </a:tr>
+              <a:tr h="468000">
+                <a:tc>
+                  <a:txBody>
+                    <a:bodyPr/>
+                    <a:lstStyle/>
+                    <a:p>
+                      <a:r>
+                        <a:rPr lang="es-ES" sz="1600" dirty="0" smtClean="0"/>
+                        <a:t>Clientes</a:t>
+                      </a:r>
+                      <a:endParaRPr lang="es-ES" sz="1600" dirty="0"/>
+                    </a:p>
+                  </a:txBody>
+                  <a:tcPr anchor="ctr">
+                    <a:lnL w="12700" cap="flat" cmpd="sng" algn="ctr">
+                      <a:solidFill>
+                        <a:schemeClr val="tx1"/>
+                      </a:solidFill>
+                      <a:prstDash val="solid"/>
+                      <a:round/>
+                      <a:headEnd type="none" w="med" len="med"/>
+                      <a:tailEnd type="none" w="med" len="med"/>
+                    </a:lnL>
+                    <a:lnR w="12700" cap="flat" cmpd="sng" algn="ctr">
+                      <a:solidFill>
+                        <a:schemeClr val="tx1"/>
+                      </a:solidFill>
+                      <a:prstDash val="solid"/>
+                      <a:round/>
+                      <a:headEnd type="none" w="med" len="med"/>
+                      <a:tailEnd type="none" w="med" len="med"/>
+                    </a:lnR>
+                    <a:lnT w="12700" cap="flat" cmpd="sng" algn="ctr">
+                      <a:solidFill>
+                        <a:schemeClr val="tx1"/>
+                      </a:solidFill>
+                      <a:prstDash val="solid"/>
+                      <a:round/>
+                      <a:headEnd type="none" w="med" len="med"/>
+                      <a:tailEnd type="none" w="med" len="med"/>
+                    </a:lnT>
+                    <a:lnB w="12700" cap="flat" cmpd="sng" algn="ctr">
+                      <a:solidFill>
+                        <a:schemeClr val="tx1"/>
+                      </a:solidFill>
+                      <a:prstDash val="solid"/>
+                      <a:round/>
+                      <a:headEnd type="none" w="med" len="med"/>
+                      <a:tailEnd type="none" w="med" len="med"/>
+                    </a:lnB>
+                  </a:tcPr>
+                </a:tc>
+              </a:tr>
+              <a:tr h="468000">
+                <a:tc>
+                  <a:txBody>
+                    <a:bodyPr/>
+                    <a:lstStyle/>
+                    <a:p>
+                      <a:r>
+                        <a:rPr lang="es-ES" sz="1600" dirty="0" smtClean="0">
+                          <a:solidFill>
+                            <a:schemeClr val="bg1"/>
+                          </a:solidFill>
+                        </a:rPr>
+                        <a:t>Lotes</a:t>
+                      </a:r>
+                      <a:endParaRPr lang="es-ES" sz="1600" dirty="0">
+                        <a:solidFill>
+                          <a:schemeClr val="bg1"/>
+                        </a:solidFill>
+                      </a:endParaRPr>
+                    </a:p>
+                  </a:txBody>
+                  <a:tcPr anchor="ctr">
+                    <a:lnL w="12700" cap="flat" cmpd="sng" algn="ctr">
+                      <a:solidFill>
+                        <a:schemeClr val="tx1"/>
+                      </a:solidFill>
+                      <a:prstDash val="solid"/>
+                      <a:round/>
+                      <a:headEnd type="none" w="med" len="med"/>
+                      <a:tailEnd type="none" w="med" len="med"/>
+                    </a:lnL>
+                    <a:lnR w="12700" cap="flat" cmpd="sng" algn="ctr">
+                      <a:solidFill>
+                        <a:schemeClr val="tx1"/>
+                      </a:solidFill>
+                      <a:prstDash val="solid"/>
+                      <a:round/>
+                      <a:headEnd type="none" w="med" len="med"/>
+                      <a:tailEnd type="none" w="med" len="med"/>
+                    </a:lnR>
+                    <a:lnT w="12700" cap="flat" cmpd="sng" algn="ctr">
+                      <a:solidFill>
+                        <a:schemeClr val="tx1"/>
+                      </a:solidFill>
+                      <a:prstDash val="solid"/>
+                      <a:round/>
+                      <a:headEnd type="none" w="med" len="med"/>
+                      <a:tailEnd type="none" w="med" len="med"/>
+                    </a:lnT>
+                    <a:lnB w="12700" cap="flat" cmpd="sng" algn="ctr">
+                      <a:solidFill>
+                        <a:schemeClr val="tx1"/>
+                      </a:solidFill>
+                      <a:prstDash val="solid"/>
+                      <a:round/>
+                      <a:headEnd type="none" w="med" len="med"/>
+                      <a:tailEnd type="none" w="med" len="med"/>
+                    </a:lnB>
+                    <a:solidFill>
+                      <a:schemeClr val="tx2"/>
+                    </a:solidFill>
+                  </a:tcPr>
+                </a:tc>
+              </a:tr>
+              <a:tr h="468000">
+                <a:tc>
+                  <a:txBody>
+                    <a:bodyPr/>
+                    <a:lstStyle/>
+                    <a:p>
+                      <a:r>
+                        <a:rPr lang="es-ES" sz="1600" dirty="0" smtClean="0"/>
+                        <a:t>Marcas</a:t>
+                      </a:r>
+                      <a:endParaRPr lang="es-ES" sz="1600" dirty="0"/>
+                    </a:p>
+                  </a:txBody>
+                  <a:tcPr anchor="ctr">
+                    <a:lnL w="12700" cap="flat" cmpd="sng" algn="ctr">
+                      <a:solidFill>
+                        <a:schemeClr val="tx1"/>
+                      </a:solidFill>
+                      <a:prstDash val="solid"/>
+                      <a:round/>
+                      <a:headEnd type="none" w="med" len="med"/>
+                      <a:tailEnd type="none" w="med" len="med"/>
+                    </a:lnL>
+                    <a:lnR w="12700" cap="flat" cmpd="sng" algn="ctr">
+                      <a:solidFill>
+                        <a:schemeClr val="tx1"/>
+                      </a:solidFill>
+                      <a:prstDash val="solid"/>
+                      <a:round/>
+                      <a:headEnd type="none" w="med" len="med"/>
+                      <a:tailEnd type="none" w="med" len="med"/>
+                    </a:lnR>
+                    <a:lnT w="12700" cap="flat" cmpd="sng" algn="ctr">
+                      <a:solidFill>
+                        <a:schemeClr val="tx1"/>
+                      </a:solidFill>
+                      <a:prstDash val="solid"/>
+                      <a:round/>
+                      <a:headEnd type="none" w="med" len="med"/>
+                      <a:tailEnd type="none" w="med" len="med"/>
+                    </a:lnT>
+                    <a:lnB w="12700" cap="flat" cmpd="sng" algn="ctr">
+                      <a:solidFill>
+                        <a:schemeClr val="tx1"/>
+                      </a:solidFill>
+                      <a:prstDash val="solid"/>
+                      <a:round/>
+                      <a:headEnd type="none" w="med" len="med"/>
+                      <a:tailEnd type="none" w="med" len="med"/>
+                    </a:lnB>
+                  </a:tcPr>
+                </a:tc>
+              </a:tr>
+              <a:tr h="468000">
+                <a:tc>
+                  <a:txBody>
+                    <a:bodyPr/>
+                    <a:lstStyle/>
+                    <a:p>
+                      <a:r>
+                        <a:rPr lang="es-ES" sz="1600" dirty="0" smtClean="0"/>
+                        <a:t>GPS</a:t>
+                      </a:r>
+                      <a:endParaRPr lang="es-ES" sz="1600" dirty="0"/>
+                    </a:p>
+                  </a:txBody>
+                  <a:tcPr anchor="ctr">
+                    <a:lnL w="12700" cap="flat" cmpd="sng" algn="ctr">
+                      <a:solidFill>
+                        <a:schemeClr val="tx1"/>
+                      </a:solidFill>
+                      <a:prstDash val="solid"/>
+                      <a:round/>
+                      <a:headEnd type="none" w="med" len="med"/>
+                      <a:tailEnd type="none" w="med" len="med"/>
+                    </a:lnL>
+                    <a:lnR w="12700" cap="flat" cmpd="sng" algn="ctr">
+                      <a:solidFill>
+                        <a:schemeClr val="tx1"/>
+                      </a:solidFill>
+                      <a:prstDash val="solid"/>
+                      <a:round/>
+                      <a:headEnd type="none" w="med" len="med"/>
+                      <a:tailEnd type="none" w="med" len="med"/>
+                    </a:lnR>
+                    <a:lnT w="12700" cap="flat" cmpd="sng" algn="ctr">
+                      <a:solidFill>
+                        <a:schemeClr val="tx1"/>
+                      </a:solidFill>
+                      <a:prstDash val="solid"/>
+                      <a:round/>
+                      <a:headEnd type="none" w="med" len="med"/>
+                      <a:tailEnd type="none" w="med" len="med"/>
+                    </a:lnT>
+                    <a:lnB w="12700" cap="flat" cmpd="sng" algn="ctr">
+                      <a:solidFill>
+                        <a:schemeClr val="tx1"/>
+                      </a:solidFill>
+                      <a:prstDash val="solid"/>
+                      <a:round/>
+                      <a:headEnd type="none" w="med" len="med"/>
+                      <a:tailEnd type="none" w="med" len="med"/>
+                    </a:lnB>
+                  </a:tcPr>
+                </a:tc>
+              </a:tr>
+              <a:tr h="468000">
+                <a:tc>
+                  <a:txBody>
+                    <a:bodyPr/>
+                    <a:lstStyle/>
+                    <a:p>
+                      <a:r>
+                        <a:rPr lang="es-ES" sz="1600" dirty="0" smtClean="0"/>
+                        <a:t>SIM</a:t>
+                      </a:r>
+                      <a:endParaRPr lang="es-ES" sz="1600" dirty="0"/>
+                    </a:p>
+                  </a:txBody>
+                  <a:tcPr anchor="ctr">
+                    <a:lnL w="12700" cap="flat" cmpd="sng" algn="ctr">
+                      <a:solidFill>
+                        <a:schemeClr val="tx1"/>
+                      </a:solidFill>
+                      <a:prstDash val="solid"/>
+                      <a:round/>
+                      <a:headEnd type="none" w="med" len="med"/>
+                      <a:tailEnd type="none" w="med" len="med"/>
+                    </a:lnL>
+                    <a:lnR w="12700" cap="flat" cmpd="sng" algn="ctr">
+                      <a:solidFill>
+                        <a:schemeClr val="tx1"/>
+                      </a:solidFill>
+                      <a:prstDash val="solid"/>
+                      <a:round/>
+                      <a:headEnd type="none" w="med" len="med"/>
+                      <a:tailEnd type="none" w="med" len="med"/>
+                    </a:lnR>
+                    <a:lnT w="12700" cap="flat" cmpd="sng" algn="ctr">
+                      <a:solidFill>
+                        <a:schemeClr val="tx1"/>
+                      </a:solidFill>
+                      <a:prstDash val="solid"/>
+                      <a:round/>
+                      <a:headEnd type="none" w="med" len="med"/>
+                      <a:tailEnd type="none" w="med" len="med"/>
+                    </a:lnT>
+                    <a:lnB w="12700" cap="flat" cmpd="sng" algn="ctr">
+                      <a:solidFill>
+                        <a:schemeClr val="tx1"/>
+                      </a:solidFill>
+                      <a:prstDash val="solid"/>
+                      <a:round/>
+                      <a:headEnd type="none" w="med" len="med"/>
+                      <a:tailEnd type="none" w="med" len="med"/>
+                    </a:lnB>
+                  </a:tcPr>
+                </a:tc>
+              </a:tr>
+              <a:tr h="468000">
+                <a:tc>
+                  <a:txBody>
+                    <a:bodyPr/>
+                    <a:lstStyle/>
+                    <a:p>
+                      <a:r>
+                        <a:rPr lang="es-ES" sz="1600" dirty="0" smtClean="0"/>
+                        <a:t>Vehículos</a:t>
+                      </a:r>
+                      <a:endParaRPr lang="es-ES" sz="1600" dirty="0"/>
+                    </a:p>
+                  </a:txBody>
+                  <a:tcPr anchor="ctr">
+                    <a:lnL w="12700" cap="flat" cmpd="sng" algn="ctr">
+                      <a:solidFill>
+                        <a:schemeClr val="tx1"/>
+                      </a:solidFill>
+                      <a:prstDash val="solid"/>
+                      <a:round/>
+                      <a:headEnd type="none" w="med" len="med"/>
+                      <a:tailEnd type="none" w="med" len="med"/>
+                    </a:lnL>
+                    <a:lnR w="12700" cap="flat" cmpd="sng" algn="ctr">
+                      <a:solidFill>
+                        <a:schemeClr val="tx1"/>
+                      </a:solidFill>
+                      <a:prstDash val="solid"/>
+                      <a:round/>
+                      <a:headEnd type="none" w="med" len="med"/>
+                      <a:tailEnd type="none" w="med" len="med"/>
+                    </a:lnR>
+                    <a:lnT w="12700" cap="flat" cmpd="sng" algn="ctr">
+                      <a:solidFill>
+                        <a:schemeClr val="tx1"/>
+                      </a:solidFill>
+                      <a:prstDash val="solid"/>
+                      <a:round/>
+                      <a:headEnd type="none" w="med" len="med"/>
+                      <a:tailEnd type="none" w="med" len="med"/>
+                    </a:lnT>
+                    <a:lnB w="12700" cap="flat" cmpd="sng" algn="ctr">
+                      <a:solidFill>
+                        <a:schemeClr val="tx1"/>
+                      </a:solidFill>
+                      <a:prstDash val="solid"/>
+                      <a:round/>
+                      <a:headEnd type="none" w="med" len="med"/>
+                      <a:tailEnd type="none" w="med" len="med"/>
+                    </a:lnB>
+                  </a:tcPr>
+                </a:tc>
+              </a:tr>
+            </a:tbl>
+          </a:graphicData>
+        </a:graphic>
+      </p:graphicFrame>
+      <p:pic>
+        <p:nvPicPr>
+          <p:cNvPr id="8" name="7 Imagen"/>
+          <p:cNvPicPr>
+            <a:picLocks noChangeAspect="1"/>
+          </p:cNvPicPr>
+          <p:nvPr/>
+        </p:nvPicPr>
+        <p:blipFill>
+          <a:blip r:embed="rId2">
+            <a:extLst>
+              <a:ext uri="{28A0092B-C50C-407E-A947-70E740481C1C}">
+                <a14:useLocalDpi xmlns:a14="http://schemas.microsoft.com/office/drawing/2010/main" val="0"/>
+              </a:ext>
+            </a:extLst>
+          </a:blip>
+          <a:stretch>
+            <a:fillRect/>
+          </a:stretch>
+        </p:blipFill>
+        <p:spPr>
+          <a:xfrm>
+            <a:off x="10538" y="582888"/>
+            <a:ext cx="2095049" cy="792088"/>
+          </a:xfrm>
+          <a:prstGeom prst="rect">
+            <a:avLst/>
+          </a:prstGeom>
+        </p:spPr>
+      </p:pic>
+      <p:sp>
+        <p:nvSpPr>
+          <p:cNvPr id="9" name="8 CuadroTexto"/>
+          <p:cNvSpPr txBox="1"/>
+          <p:nvPr/>
+        </p:nvSpPr>
+        <p:spPr>
+          <a:xfrm>
+            <a:off x="5028163" y="717322"/>
+            <a:ext cx="959878" cy="523220"/>
+          </a:xfrm>
+          <a:prstGeom prst="rect">
+            <a:avLst/>
+          </a:prstGeom>
+          <a:noFill/>
+        </p:spPr>
+        <p:txBody>
+          <a:bodyPr wrap="none" rtlCol="0">
+            <a:spAutoFit/>
+          </a:bodyPr>
+          <a:lstStyle/>
+          <a:p>
+            <a:r>
+              <a:rPr lang="es-ES" sz="2800" dirty="0" smtClean="0"/>
+              <a:t>Lotes</a:t>
+            </a:r>
+            <a:endParaRPr lang="es-ES" sz="2800" dirty="0"/>
+          </a:p>
+        </p:txBody>
+      </p:sp>
+      <p:sp>
+        <p:nvSpPr>
+          <p:cNvPr id="2" name="1 Rectángulo"/>
+          <p:cNvSpPr/>
+          <p:nvPr/>
+        </p:nvSpPr>
+        <p:spPr>
+          <a:xfrm>
+            <a:off x="10538" y="0"/>
+            <a:ext cx="9133462" cy="555526"/>
+          </a:xfrm>
+          <a:prstGeom prst="rect">
+            <a:avLst/>
+          </a:prstGeom>
+          <a:ln>
+            <a:noFill/>
+          </a:ln>
+        </p:spPr>
+        <p:style>
+          <a:lnRef idx="1">
+            <a:schemeClr val="dk1"/>
+          </a:lnRef>
+          <a:fillRef idx="2">
+            <a:schemeClr val="dk1"/>
+          </a:fillRef>
+          <a:effectRef idx="1">
+            <a:schemeClr val="dk1"/>
+          </a:effectRef>
+          <a:fontRef idx="minor">
+            <a:schemeClr val="dk1"/>
+          </a:fontRef>
+        </p:style>
+        <p:txBody>
+          <a:bodyPr rtlCol="0" anchor="ctr"/>
+          <a:lstStyle/>
+          <a:p>
+            <a:pPr algn="ctr"/>
+            <a:endParaRPr lang="es-ES"/>
+          </a:p>
+        </p:txBody>
+      </p:sp>
+      <p:sp>
+        <p:nvSpPr>
+          <p:cNvPr id="3" name="2 Rectángulo"/>
+          <p:cNvSpPr/>
+          <p:nvPr/>
+        </p:nvSpPr>
+        <p:spPr>
+          <a:xfrm>
+            <a:off x="2195736" y="123478"/>
+            <a:ext cx="6120680" cy="288032"/>
+          </a:xfrm>
+          <a:prstGeom prst="rect">
+            <a:avLst/>
+          </a:prstGeom>
+          <a:ln>
+            <a:solidFill>
+              <a:schemeClr val="bg1"/>
+            </a:solidFill>
+          </a:ln>
+        </p:spPr>
+        <p:style>
+          <a:lnRef idx="2">
+            <a:schemeClr val="dk1"/>
+          </a:lnRef>
+          <a:fillRef idx="1">
+            <a:schemeClr val="lt1"/>
+          </a:fillRef>
+          <a:effectRef idx="0">
+            <a:schemeClr val="dk1"/>
+          </a:effectRef>
+          <a:fontRef idx="minor">
+            <a:schemeClr val="dk1"/>
+          </a:fontRef>
+        </p:style>
+        <p:txBody>
+          <a:bodyPr rtlCol="0" anchor="ctr"/>
+          <a:lstStyle/>
+          <a:p>
+            <a:r>
+              <a:rPr lang="es-ES" dirty="0" smtClean="0"/>
+              <a:t>Skyranger.com/lotes/nuevo</a:t>
+            </a:r>
+            <a:endParaRPr lang="es-ES" dirty="0"/>
+          </a:p>
+        </p:txBody>
+      </p:sp>
+      <p:sp>
+        <p:nvSpPr>
+          <p:cNvPr id="27" name="26 CuadroTexto"/>
+          <p:cNvSpPr txBox="1"/>
+          <p:nvPr/>
+        </p:nvSpPr>
+        <p:spPr>
+          <a:xfrm>
+            <a:off x="3995936" y="3446879"/>
+            <a:ext cx="912494" cy="276999"/>
+          </a:xfrm>
+          <a:prstGeom prst="rect">
+            <a:avLst/>
+          </a:prstGeom>
+          <a:noFill/>
+        </p:spPr>
+        <p:txBody>
+          <a:bodyPr wrap="none" rtlCol="0">
+            <a:spAutoFit/>
+          </a:bodyPr>
+          <a:lstStyle/>
+          <a:p>
+            <a:r>
+              <a:rPr lang="es-ES" sz="1200" dirty="0" smtClean="0"/>
+              <a:t>Precio Total</a:t>
+            </a:r>
+            <a:endParaRPr lang="es-ES" sz="1200" dirty="0"/>
+          </a:p>
+        </p:txBody>
+      </p:sp>
+      <p:sp>
+        <p:nvSpPr>
+          <p:cNvPr id="28" name="27 Rectángulo"/>
+          <p:cNvSpPr/>
+          <p:nvPr/>
+        </p:nvSpPr>
+        <p:spPr>
+          <a:xfrm>
+            <a:off x="4079418" y="3734911"/>
+            <a:ext cx="1561122" cy="276999"/>
+          </a:xfrm>
+          <a:prstGeom prst="rect">
+            <a:avLst/>
+          </a:prstGeom>
+        </p:spPr>
+        <p:style>
+          <a:lnRef idx="2">
+            <a:schemeClr val="accent1"/>
+          </a:lnRef>
+          <a:fillRef idx="1">
+            <a:schemeClr val="lt1"/>
+          </a:fillRef>
+          <a:effectRef idx="0">
+            <a:schemeClr val="accent1"/>
+          </a:effectRef>
+          <a:fontRef idx="minor">
+            <a:schemeClr val="dk1"/>
+          </a:fontRef>
+        </p:style>
+        <p:txBody>
+          <a:bodyPr rtlCol="0" anchor="ctr"/>
+          <a:lstStyle/>
+          <a:p>
+            <a:endParaRPr lang="es-ES" sz="1200" dirty="0"/>
+          </a:p>
+        </p:txBody>
+      </p:sp>
+      <p:sp>
+        <p:nvSpPr>
+          <p:cNvPr id="29" name="28 CuadroTexto"/>
+          <p:cNvSpPr txBox="1"/>
+          <p:nvPr/>
+        </p:nvSpPr>
+        <p:spPr>
+          <a:xfrm>
+            <a:off x="6156178" y="3468817"/>
+            <a:ext cx="1118511" cy="276999"/>
+          </a:xfrm>
+          <a:prstGeom prst="rect">
+            <a:avLst/>
+          </a:prstGeom>
+          <a:noFill/>
+        </p:spPr>
+        <p:txBody>
+          <a:bodyPr wrap="none" rtlCol="0">
+            <a:spAutoFit/>
+          </a:bodyPr>
+          <a:lstStyle/>
+          <a:p>
+            <a:r>
+              <a:rPr lang="es-ES" sz="1200" dirty="0" smtClean="0"/>
+              <a:t>Precio Unitario</a:t>
+            </a:r>
+            <a:endParaRPr lang="es-ES" sz="1200" dirty="0"/>
+          </a:p>
+        </p:txBody>
+      </p:sp>
+      <p:sp>
+        <p:nvSpPr>
+          <p:cNvPr id="30" name="29 Rectángulo"/>
+          <p:cNvSpPr/>
+          <p:nvPr/>
+        </p:nvSpPr>
+        <p:spPr>
+          <a:xfrm>
+            <a:off x="6228185" y="3723878"/>
+            <a:ext cx="1512167" cy="276999"/>
+          </a:xfrm>
+          <a:prstGeom prst="rect">
+            <a:avLst/>
+          </a:prstGeom>
+        </p:spPr>
+        <p:style>
+          <a:lnRef idx="2">
+            <a:schemeClr val="accent1"/>
+          </a:lnRef>
+          <a:fillRef idx="1">
+            <a:schemeClr val="lt1"/>
+          </a:fillRef>
+          <a:effectRef idx="0">
+            <a:schemeClr val="accent1"/>
+          </a:effectRef>
+          <a:fontRef idx="minor">
+            <a:schemeClr val="dk1"/>
+          </a:fontRef>
+        </p:style>
+        <p:txBody>
+          <a:bodyPr rtlCol="0" anchor="ctr"/>
+          <a:lstStyle/>
+          <a:p>
+            <a:endParaRPr lang="es-ES" sz="1200" dirty="0"/>
+          </a:p>
+        </p:txBody>
+      </p:sp>
+      <p:sp>
+        <p:nvSpPr>
+          <p:cNvPr id="37" name="36 Rectángulo"/>
+          <p:cNvSpPr/>
+          <p:nvPr/>
+        </p:nvSpPr>
+        <p:spPr>
+          <a:xfrm>
+            <a:off x="6300190" y="4299942"/>
+            <a:ext cx="1457004" cy="504056"/>
+          </a:xfrm>
+          <a:prstGeom prst="rect">
+            <a:avLst/>
+          </a:prstGeom>
+        </p:spPr>
+        <p:style>
+          <a:lnRef idx="0">
+            <a:schemeClr val="accent1"/>
+          </a:lnRef>
+          <a:fillRef idx="3">
+            <a:schemeClr val="accent1"/>
+          </a:fillRef>
+          <a:effectRef idx="3">
+            <a:schemeClr val="accent1"/>
+          </a:effectRef>
+          <a:fontRef idx="minor">
+            <a:schemeClr val="lt1"/>
+          </a:fontRef>
+        </p:style>
+        <p:txBody>
+          <a:bodyPr rtlCol="0" anchor="ctr"/>
+          <a:lstStyle/>
+          <a:p>
+            <a:pPr algn="ctr"/>
+            <a:r>
+              <a:rPr lang="es-ES" dirty="0" smtClean="0"/>
+              <a:t>Registrar</a:t>
+            </a:r>
+            <a:endParaRPr lang="es-ES" dirty="0"/>
+          </a:p>
+        </p:txBody>
+      </p:sp>
+      <p:sp>
+        <p:nvSpPr>
+          <p:cNvPr id="39" name="38 Rectángulo"/>
+          <p:cNvSpPr/>
+          <p:nvPr/>
+        </p:nvSpPr>
+        <p:spPr>
+          <a:xfrm>
+            <a:off x="3693708" y="4299942"/>
+            <a:ext cx="1457004" cy="504056"/>
+          </a:xfrm>
+          <a:prstGeom prst="rect">
+            <a:avLst/>
+          </a:prstGeom>
+        </p:spPr>
+        <p:style>
+          <a:lnRef idx="0">
+            <a:schemeClr val="accent2"/>
+          </a:lnRef>
+          <a:fillRef idx="3">
+            <a:schemeClr val="accent2"/>
+          </a:fillRef>
+          <a:effectRef idx="3">
+            <a:schemeClr val="accent2"/>
+          </a:effectRef>
+          <a:fontRef idx="minor">
+            <a:schemeClr val="lt1"/>
+          </a:fontRef>
+        </p:style>
+        <p:txBody>
+          <a:bodyPr rtlCol="0" anchor="ctr"/>
+          <a:lstStyle/>
+          <a:p>
+            <a:pPr algn="ctr"/>
+            <a:r>
+              <a:rPr lang="es-ES" dirty="0" smtClean="0"/>
+              <a:t>Cancelar</a:t>
+            </a:r>
+            <a:endParaRPr lang="es-ES" dirty="0"/>
+          </a:p>
+        </p:txBody>
+      </p:sp>
+      <p:sp>
+        <p:nvSpPr>
+          <p:cNvPr id="40" name="39 CuadroTexto"/>
+          <p:cNvSpPr txBox="1"/>
+          <p:nvPr/>
+        </p:nvSpPr>
+        <p:spPr>
+          <a:xfrm>
+            <a:off x="3138182" y="2715766"/>
+            <a:ext cx="578685" cy="276999"/>
+          </a:xfrm>
+          <a:prstGeom prst="rect">
+            <a:avLst/>
+          </a:prstGeom>
+          <a:noFill/>
+        </p:spPr>
+        <p:txBody>
+          <a:bodyPr wrap="none" rtlCol="0">
+            <a:spAutoFit/>
+          </a:bodyPr>
+          <a:lstStyle/>
+          <a:p>
+            <a:r>
+              <a:rPr lang="es-ES" sz="1200" dirty="0" smtClean="0"/>
+              <a:t>Marca</a:t>
+            </a:r>
+            <a:endParaRPr lang="es-ES" sz="1200" dirty="0"/>
+          </a:p>
+        </p:txBody>
+      </p:sp>
+      <p:sp>
+        <p:nvSpPr>
+          <p:cNvPr id="41" name="40 Rectángulo"/>
+          <p:cNvSpPr/>
+          <p:nvPr/>
+        </p:nvSpPr>
+        <p:spPr>
+          <a:xfrm>
+            <a:off x="3226902" y="3001255"/>
+            <a:ext cx="1561122" cy="276999"/>
+          </a:xfrm>
+          <a:prstGeom prst="rect">
+            <a:avLst/>
+          </a:prstGeom>
+        </p:spPr>
+        <p:style>
+          <a:lnRef idx="2">
+            <a:schemeClr val="accent1"/>
+          </a:lnRef>
+          <a:fillRef idx="1">
+            <a:schemeClr val="lt1"/>
+          </a:fillRef>
+          <a:effectRef idx="0">
+            <a:schemeClr val="accent1"/>
+          </a:effectRef>
+          <a:fontRef idx="minor">
+            <a:schemeClr val="dk1"/>
+          </a:fontRef>
+        </p:style>
+        <p:txBody>
+          <a:bodyPr rtlCol="0" anchor="ctr"/>
+          <a:lstStyle/>
+          <a:p>
+            <a:endParaRPr lang="es-ES" sz="1200" dirty="0"/>
+          </a:p>
+        </p:txBody>
+      </p:sp>
+      <p:sp>
+        <p:nvSpPr>
+          <p:cNvPr id="42" name="41 Triángulo isósceles"/>
+          <p:cNvSpPr/>
+          <p:nvPr/>
+        </p:nvSpPr>
+        <p:spPr>
+          <a:xfrm flipV="1">
+            <a:off x="4619889" y="3139481"/>
+            <a:ext cx="96127" cy="72008"/>
+          </a:xfrm>
+          <a:prstGeom prst="triangle">
+            <a:avLst/>
+          </a:prstGeom>
+        </p:spPr>
+        <p:style>
+          <a:lnRef idx="2">
+            <a:schemeClr val="accent1">
+              <a:shade val="50000"/>
+            </a:schemeClr>
+          </a:lnRef>
+          <a:fillRef idx="1">
+            <a:schemeClr val="accent1"/>
+          </a:fillRef>
+          <a:effectRef idx="0">
+            <a:schemeClr val="accent1"/>
+          </a:effectRef>
+          <a:fontRef idx="minor">
+            <a:schemeClr val="lt1"/>
+          </a:fontRef>
+        </p:style>
+        <p:txBody>
+          <a:bodyPr rtlCol="0" anchor="ctr"/>
+          <a:lstStyle/>
+          <a:p>
+            <a:pPr algn="ctr"/>
+            <a:endParaRPr lang="es-ES"/>
+          </a:p>
+        </p:txBody>
+      </p:sp>
+      <p:sp>
+        <p:nvSpPr>
+          <p:cNvPr id="43" name="42 CuadroTexto"/>
+          <p:cNvSpPr txBox="1"/>
+          <p:nvPr/>
+        </p:nvSpPr>
+        <p:spPr>
+          <a:xfrm>
+            <a:off x="5150712" y="2729342"/>
+            <a:ext cx="671979" cy="276999"/>
+          </a:xfrm>
+          <a:prstGeom prst="rect">
+            <a:avLst/>
+          </a:prstGeom>
+          <a:noFill/>
+        </p:spPr>
+        <p:txBody>
+          <a:bodyPr wrap="none" rtlCol="0">
+            <a:spAutoFit/>
+          </a:bodyPr>
+          <a:lstStyle/>
+          <a:p>
+            <a:r>
+              <a:rPr lang="es-ES" sz="1200" dirty="0" smtClean="0"/>
+              <a:t>Modelo</a:t>
+            </a:r>
+            <a:endParaRPr lang="es-ES" sz="1200" dirty="0"/>
+          </a:p>
+        </p:txBody>
+      </p:sp>
+      <p:sp>
+        <p:nvSpPr>
+          <p:cNvPr id="44" name="43 Rectángulo"/>
+          <p:cNvSpPr/>
+          <p:nvPr/>
+        </p:nvSpPr>
+        <p:spPr>
+          <a:xfrm>
+            <a:off x="5239432" y="3003798"/>
+            <a:ext cx="1492808" cy="276999"/>
+          </a:xfrm>
+          <a:prstGeom prst="rect">
+            <a:avLst/>
+          </a:prstGeom>
+        </p:spPr>
+        <p:style>
+          <a:lnRef idx="2">
+            <a:schemeClr val="accent1"/>
+          </a:lnRef>
+          <a:fillRef idx="1">
+            <a:schemeClr val="lt1"/>
+          </a:fillRef>
+          <a:effectRef idx="0">
+            <a:schemeClr val="accent1"/>
+          </a:effectRef>
+          <a:fontRef idx="minor">
+            <a:schemeClr val="dk1"/>
+          </a:fontRef>
+        </p:style>
+        <p:txBody>
+          <a:bodyPr rtlCol="0" anchor="ctr"/>
+          <a:lstStyle/>
+          <a:p>
+            <a:endParaRPr lang="es-ES" sz="1200" dirty="0"/>
+          </a:p>
+        </p:txBody>
+      </p:sp>
+      <p:sp>
+        <p:nvSpPr>
+          <p:cNvPr id="45" name="44 Triángulo isósceles"/>
+          <p:cNvSpPr/>
+          <p:nvPr/>
+        </p:nvSpPr>
+        <p:spPr>
+          <a:xfrm flipV="1">
+            <a:off x="6564105" y="3147814"/>
+            <a:ext cx="96127" cy="72008"/>
+          </a:xfrm>
+          <a:prstGeom prst="triangle">
+            <a:avLst/>
+          </a:prstGeom>
+        </p:spPr>
+        <p:style>
+          <a:lnRef idx="2">
+            <a:schemeClr val="accent1">
+              <a:shade val="50000"/>
+            </a:schemeClr>
+          </a:lnRef>
+          <a:fillRef idx="1">
+            <a:schemeClr val="accent1"/>
+          </a:fillRef>
+          <a:effectRef idx="0">
+            <a:schemeClr val="accent1"/>
+          </a:effectRef>
+          <a:fontRef idx="minor">
+            <a:schemeClr val="lt1"/>
+          </a:fontRef>
+        </p:style>
+        <p:txBody>
+          <a:bodyPr rtlCol="0" anchor="ctr"/>
+          <a:lstStyle/>
+          <a:p>
+            <a:pPr algn="ctr"/>
+            <a:endParaRPr lang="es-ES"/>
+          </a:p>
+        </p:txBody>
+      </p:sp>
+      <p:sp>
+        <p:nvSpPr>
+          <p:cNvPr id="46" name="45 CuadroTexto"/>
+          <p:cNvSpPr txBox="1"/>
+          <p:nvPr/>
+        </p:nvSpPr>
+        <p:spPr>
+          <a:xfrm>
+            <a:off x="7020272" y="2715766"/>
+            <a:ext cx="453970" cy="276999"/>
+          </a:xfrm>
+          <a:prstGeom prst="rect">
+            <a:avLst/>
+          </a:prstGeom>
+          <a:noFill/>
+        </p:spPr>
+        <p:txBody>
+          <a:bodyPr wrap="none" rtlCol="0">
+            <a:spAutoFit/>
+          </a:bodyPr>
+          <a:lstStyle/>
+          <a:p>
+            <a:r>
+              <a:rPr lang="es-ES" sz="1200" dirty="0" smtClean="0"/>
+              <a:t>APN</a:t>
+            </a:r>
+            <a:endParaRPr lang="es-ES" sz="1200" dirty="0"/>
+          </a:p>
+        </p:txBody>
+      </p:sp>
+      <p:sp>
+        <p:nvSpPr>
+          <p:cNvPr id="47" name="46 Rectángulo"/>
+          <p:cNvSpPr/>
+          <p:nvPr/>
+        </p:nvSpPr>
+        <p:spPr>
+          <a:xfrm>
+            <a:off x="7075227" y="3003798"/>
+            <a:ext cx="1529220" cy="276999"/>
+          </a:xfrm>
+          <a:prstGeom prst="rect">
+            <a:avLst/>
+          </a:prstGeom>
+        </p:spPr>
+        <p:style>
+          <a:lnRef idx="2">
+            <a:schemeClr val="accent1"/>
+          </a:lnRef>
+          <a:fillRef idx="1">
+            <a:schemeClr val="lt1"/>
+          </a:fillRef>
+          <a:effectRef idx="0">
+            <a:schemeClr val="accent1"/>
+          </a:effectRef>
+          <a:fontRef idx="minor">
+            <a:schemeClr val="dk1"/>
+          </a:fontRef>
+        </p:style>
+        <p:txBody>
+          <a:bodyPr rtlCol="0" anchor="ctr"/>
+          <a:lstStyle/>
+          <a:p>
+            <a:endParaRPr lang="es-ES" sz="1200" dirty="0"/>
+          </a:p>
+        </p:txBody>
+      </p:sp>
+    </p:spTree>
+    <p:extLst>
+      <p:ext uri="{BB962C8B-B14F-4D97-AF65-F5344CB8AC3E}">
+        <p14:creationId xmlns:p14="http://schemas.microsoft.com/office/powerpoint/2010/main" val="2661709714"/>
+      </p:ext>
+    </p:extLst>
+  </p:cSld>
+  <p:clrMapOvr>
+    <a:masterClrMapping/>
+  </p:clrMapOvr>
+</p:sld>
+</file>
+
+<file path=ppt/slides/slide5.xml><?xml version="1.0" encoding="utf-8"?>
 <p:sld xmlns:a="http://schemas.openxmlformats.org/drawingml/2006/main" xmlns:r="http://schemas.openxmlformats.org/officeDocument/2006/relationships" xmlns:p="http://schemas.openxmlformats.org/presentationml/2006/main">
   <p:cSld>
     <p:spTree>
@@ -6913,7 +9743,7 @@
                     <a:p>
                       <a:pPr algn="ctr"/>
                       <a:r>
-                        <a:rPr lang="es-ES" sz="700" dirty="0" err="1" smtClean="0"/>
+                        <a:rPr lang="es-ES" sz="700" dirty="0" smtClean="0"/>
                         <a:t>Teltonika</a:t>
                       </a:r>
                       <a:endParaRPr lang="es-ES" sz="700" dirty="0"/>
@@ -7063,7 +9893,7 @@
                     <a:p>
                       <a:pPr algn="ctr"/>
                       <a:r>
-                        <a:rPr lang="es-ES" sz="700" dirty="0" err="1" smtClean="0"/>
+                        <a:rPr lang="es-ES" sz="700" dirty="0" smtClean="0"/>
                         <a:t>Teltonika</a:t>
                       </a:r>
                       <a:endParaRPr lang="es-ES" sz="700" dirty="0"/>
@@ -7109,11 +9939,7 @@
                       <a:pPr algn="ctr"/>
                       <a:r>
                         <a:rPr lang="es-ES" sz="700" dirty="0" smtClean="0"/>
-                        <a:t>Q. </a:t>
-                      </a:r>
-                      <a:r>
-                        <a:rPr lang="es-ES" sz="700" dirty="0" smtClean="0"/>
-                        <a:t>95.00</a:t>
+                        <a:t>Q. 95.00</a:t>
                       </a:r>
                       <a:endParaRPr lang="es-ES" sz="700" dirty="0"/>
                     </a:p>
@@ -7143,11 +9969,7 @@
                       <a:pPr algn="ctr"/>
                       <a:r>
                         <a:rPr lang="es-ES" sz="700" dirty="0" smtClean="0"/>
-                        <a:t>Q. </a:t>
-                      </a:r>
-                      <a:r>
-                        <a:rPr lang="es-ES" sz="700" dirty="0" smtClean="0"/>
-                        <a:t>190.00</a:t>
+                        <a:t>Q. 190.00</a:t>
                       </a:r>
                       <a:endParaRPr lang="es-ES" sz="700" dirty="0"/>
                     </a:p>
@@ -7769,8 +10591,8 @@
         </p:nvSpPr>
         <p:spPr>
           <a:xfrm>
-            <a:off x="3275854" y="1707654"/>
-            <a:ext cx="2697763" cy="349556"/>
+            <a:off x="3275854" y="1942094"/>
+            <a:ext cx="2880322" cy="349556"/>
           </a:xfrm>
           <a:prstGeom prst="rect">
             <a:avLst/>
@@ -7806,8 +10628,21 @@
                   <a:schemeClr val="tx1"/>
                 </a:solidFill>
               </a:rPr>
-              <a:t>Según Cantidad de artículos</a:t>
+              <a:t>Según Cantidad de </a:t>
             </a:r>
+            <a:r>
+              <a:rPr lang="es-ES" sz="1600" dirty="0" smtClean="0">
+                <a:solidFill>
+                  <a:schemeClr val="tx1"/>
+                </a:solidFill>
+              </a:rPr>
+              <a:t>dispositivos</a:t>
+            </a:r>
+            <a:endParaRPr lang="es-ES" sz="1600" dirty="0" smtClean="0">
+              <a:solidFill>
+                <a:schemeClr val="tx1"/>
+              </a:solidFill>
+            </a:endParaRPr>
           </a:p>
         </p:txBody>
       </p:sp>
@@ -7819,7 +10654,7 @@
         </p:nvSpPr>
         <p:spPr>
           <a:xfrm>
-            <a:off x="5070375" y="2108940"/>
+            <a:off x="5070375" y="2343380"/>
             <a:ext cx="1499750" cy="349555"/>
           </a:xfrm>
           <a:prstGeom prst="rect">
@@ -7856,7 +10691,7 @@
         </p:nvSpPr>
         <p:spPr>
           <a:xfrm>
-            <a:off x="3427625" y="2131771"/>
+            <a:off x="3427625" y="2366211"/>
             <a:ext cx="1362670" cy="349555"/>
           </a:xfrm>
           <a:prstGeom prst="rect">
@@ -7897,7 +10732,7 @@
         </p:nvSpPr>
         <p:spPr>
           <a:xfrm flipH="1" flipV="1">
-            <a:off x="4548413" y="2263139"/>
+            <a:off x="4548413" y="2497579"/>
             <a:ext cx="149285" cy="144016"/>
           </a:xfrm>
           <a:prstGeom prst="triangle">
@@ -7937,8 +10772,8 @@
         </p:nvSpPr>
         <p:spPr>
           <a:xfrm>
-            <a:off x="3402925" y="2877840"/>
-            <a:ext cx="2697763" cy="349556"/>
+            <a:off x="3402926" y="2877840"/>
+            <a:ext cx="1387370" cy="349556"/>
           </a:xfrm>
           <a:prstGeom prst="rect">
             <a:avLst/>
@@ -7974,8 +10809,13 @@
                   <a:schemeClr val="tx1"/>
                 </a:solidFill>
               </a:rPr>
-              <a:t>Desde fecha</a:t>
+              <a:t>Desde</a:t>
             </a:r>
+            <a:endParaRPr lang="es-ES" sz="1600" dirty="0" smtClean="0">
+              <a:solidFill>
+                <a:schemeClr val="tx1"/>
+              </a:solidFill>
+            </a:endParaRPr>
           </a:p>
         </p:txBody>
       </p:sp>
@@ -7988,7 +10828,7 @@
         <p:spPr>
           <a:xfrm>
             <a:off x="3468152" y="3267172"/>
-            <a:ext cx="1499750" cy="349555"/>
+            <a:ext cx="1322143" cy="349555"/>
           </a:xfrm>
           <a:prstGeom prst="rect">
             <a:avLst/>
@@ -8101,6 +10941,315 @@
               <a:t>Cancelar</a:t>
             </a:r>
             <a:endParaRPr lang="es-ES" dirty="0"/>
+          </a:p>
+        </p:txBody>
+      </p:sp>
+      <p:sp>
+        <p:nvSpPr>
+          <p:cNvPr id="30" name="29 Rectángulo"/>
+          <p:cNvSpPr/>
+          <p:nvPr/>
+        </p:nvSpPr>
+        <p:spPr>
+          <a:xfrm>
+            <a:off x="5052775" y="2877840"/>
+            <a:ext cx="1387370" cy="349556"/>
+          </a:xfrm>
+          <a:prstGeom prst="rect">
+            <a:avLst/>
+          </a:prstGeom>
+          <a:noFill/>
+          <a:ln>
+            <a:noFill/>
+          </a:ln>
+        </p:spPr>
+        <p:style>
+          <a:lnRef idx="2">
+            <a:schemeClr val="accent1">
+              <a:shade val="50000"/>
+            </a:schemeClr>
+          </a:lnRef>
+          <a:fillRef idx="1">
+            <a:schemeClr val="accent1"/>
+          </a:fillRef>
+          <a:effectRef idx="0">
+            <a:schemeClr val="accent1"/>
+          </a:effectRef>
+          <a:fontRef idx="minor">
+            <a:schemeClr val="lt1"/>
+          </a:fontRef>
+        </p:style>
+        <p:txBody>
+          <a:bodyPr rtlCol="0" anchor="ctr"/>
+          <a:lstStyle/>
+          <a:p>
+            <a:r>
+              <a:rPr lang="es-ES" sz="1600" dirty="0" smtClean="0">
+                <a:solidFill>
+                  <a:schemeClr val="tx1"/>
+                </a:solidFill>
+              </a:rPr>
+              <a:t>Hasta</a:t>
+            </a:r>
+            <a:endParaRPr lang="es-ES" sz="1600" dirty="0" smtClean="0">
+              <a:solidFill>
+                <a:schemeClr val="tx1"/>
+              </a:solidFill>
+            </a:endParaRPr>
+          </a:p>
+        </p:txBody>
+      </p:sp>
+      <p:sp>
+        <p:nvSpPr>
+          <p:cNvPr id="31" name="30 Rectángulo"/>
+          <p:cNvSpPr/>
+          <p:nvPr/>
+        </p:nvSpPr>
+        <p:spPr>
+          <a:xfrm>
+            <a:off x="5118001" y="3267172"/>
+            <a:ext cx="1322143" cy="349555"/>
+          </a:xfrm>
+          <a:prstGeom prst="rect">
+            <a:avLst/>
+          </a:prstGeom>
+        </p:spPr>
+        <p:style>
+          <a:lnRef idx="2">
+            <a:schemeClr val="accent1"/>
+          </a:lnRef>
+          <a:fillRef idx="1">
+            <a:schemeClr val="lt1"/>
+          </a:fillRef>
+          <a:effectRef idx="0">
+            <a:schemeClr val="accent1"/>
+          </a:effectRef>
+          <a:fontRef idx="minor">
+            <a:schemeClr val="dk1"/>
+          </a:fontRef>
+        </p:style>
+        <p:txBody>
+          <a:bodyPr rtlCol="0" anchor="ctr"/>
+          <a:lstStyle/>
+          <a:p>
+            <a:r>
+              <a:rPr lang="es-ES" dirty="0" smtClean="0"/>
+              <a:t>--/--/----</a:t>
+            </a:r>
+            <a:endParaRPr lang="es-ES" dirty="0"/>
+          </a:p>
+        </p:txBody>
+      </p:sp>
+      <p:sp>
+        <p:nvSpPr>
+          <p:cNvPr id="32" name="31 Elipse"/>
+          <p:cNvSpPr/>
+          <p:nvPr/>
+        </p:nvSpPr>
+        <p:spPr>
+          <a:xfrm>
+            <a:off x="4615910" y="1599428"/>
+            <a:ext cx="108012" cy="98859"/>
+          </a:xfrm>
+          <a:prstGeom prst="ellipse">
+            <a:avLst/>
+          </a:prstGeom>
+          <a:solidFill>
+            <a:schemeClr val="bg1"/>
+          </a:solidFill>
+        </p:spPr>
+        <p:style>
+          <a:lnRef idx="3">
+            <a:schemeClr val="lt1"/>
+          </a:lnRef>
+          <a:fillRef idx="1">
+            <a:schemeClr val="accent1"/>
+          </a:fillRef>
+          <a:effectRef idx="1">
+            <a:schemeClr val="accent1"/>
+          </a:effectRef>
+          <a:fontRef idx="minor">
+            <a:schemeClr val="lt1"/>
+          </a:fontRef>
+        </p:style>
+        <p:txBody>
+          <a:bodyPr rtlCol="0" anchor="ctr"/>
+          <a:lstStyle/>
+          <a:p>
+            <a:pPr algn="ctr"/>
+            <a:endParaRPr lang="es-ES"/>
+          </a:p>
+        </p:txBody>
+      </p:sp>
+      <p:sp>
+        <p:nvSpPr>
+          <p:cNvPr id="33" name="32 CuadroTexto"/>
+          <p:cNvSpPr txBox="1"/>
+          <p:nvPr/>
+        </p:nvSpPr>
+        <p:spPr>
+          <a:xfrm>
+            <a:off x="4687918" y="1518052"/>
+            <a:ext cx="580608" cy="261610"/>
+          </a:xfrm>
+          <a:prstGeom prst="rect">
+            <a:avLst/>
+          </a:prstGeom>
+          <a:noFill/>
+        </p:spPr>
+        <p:txBody>
+          <a:bodyPr wrap="none" rtlCol="0">
+            <a:spAutoFit/>
+          </a:bodyPr>
+          <a:lstStyle/>
+          <a:p>
+            <a:r>
+              <a:rPr lang="es-ES" sz="1100" dirty="0" smtClean="0"/>
+              <a:t>Ambos</a:t>
+            </a:r>
+            <a:endParaRPr lang="es-ES" sz="1100" dirty="0"/>
+          </a:p>
+        </p:txBody>
+      </p:sp>
+      <p:sp>
+        <p:nvSpPr>
+          <p:cNvPr id="34" name="33 Elipse"/>
+          <p:cNvSpPr/>
+          <p:nvPr/>
+        </p:nvSpPr>
+        <p:spPr>
+          <a:xfrm>
+            <a:off x="3463782" y="1599427"/>
+            <a:ext cx="108012" cy="98859"/>
+          </a:xfrm>
+          <a:prstGeom prst="ellipse">
+            <a:avLst/>
+          </a:prstGeom>
+          <a:solidFill>
+            <a:schemeClr val="tx2"/>
+          </a:solidFill>
+        </p:spPr>
+        <p:style>
+          <a:lnRef idx="3">
+            <a:schemeClr val="lt1"/>
+          </a:lnRef>
+          <a:fillRef idx="1">
+            <a:schemeClr val="accent1"/>
+          </a:fillRef>
+          <a:effectRef idx="1">
+            <a:schemeClr val="accent1"/>
+          </a:effectRef>
+          <a:fontRef idx="minor">
+            <a:schemeClr val="lt1"/>
+          </a:fontRef>
+        </p:style>
+        <p:txBody>
+          <a:bodyPr rtlCol="0" anchor="ctr"/>
+          <a:lstStyle/>
+          <a:p>
+            <a:pPr algn="ctr"/>
+            <a:endParaRPr lang="es-ES"/>
+          </a:p>
+        </p:txBody>
+      </p:sp>
+      <p:sp>
+        <p:nvSpPr>
+          <p:cNvPr id="35" name="34 CuadroTexto"/>
+          <p:cNvSpPr txBox="1"/>
+          <p:nvPr/>
+        </p:nvSpPr>
+        <p:spPr>
+          <a:xfrm>
+            <a:off x="3533158" y="1497473"/>
+            <a:ext cx="404278" cy="261610"/>
+          </a:xfrm>
+          <a:prstGeom prst="rect">
+            <a:avLst/>
+          </a:prstGeom>
+          <a:noFill/>
+        </p:spPr>
+        <p:txBody>
+          <a:bodyPr wrap="none" rtlCol="0">
+            <a:spAutoFit/>
+          </a:bodyPr>
+          <a:lstStyle/>
+          <a:p>
+            <a:r>
+              <a:rPr lang="es-ES" sz="1100" dirty="0" smtClean="0"/>
+              <a:t>SIM</a:t>
+            </a:r>
+            <a:endParaRPr lang="es-ES" sz="1100" dirty="0"/>
+          </a:p>
+        </p:txBody>
+      </p:sp>
+      <p:sp>
+        <p:nvSpPr>
+          <p:cNvPr id="36" name="35 Elipse"/>
+          <p:cNvSpPr/>
+          <p:nvPr/>
+        </p:nvSpPr>
+        <p:spPr>
+          <a:xfrm>
+            <a:off x="3990490" y="1599428"/>
+            <a:ext cx="108012" cy="98859"/>
+          </a:xfrm>
+          <a:prstGeom prst="ellipse">
+            <a:avLst/>
+          </a:prstGeom>
+          <a:solidFill>
+            <a:schemeClr val="bg1"/>
+          </a:solidFill>
+        </p:spPr>
+        <p:style>
+          <a:lnRef idx="3">
+            <a:schemeClr val="lt1"/>
+          </a:lnRef>
+          <a:fillRef idx="1">
+            <a:schemeClr val="accent1"/>
+          </a:fillRef>
+          <a:effectRef idx="1">
+            <a:schemeClr val="accent1"/>
+          </a:effectRef>
+          <a:fontRef idx="minor">
+            <a:schemeClr val="lt1"/>
+          </a:fontRef>
+        </p:style>
+        <p:txBody>
+          <a:bodyPr rtlCol="0" anchor="ctr"/>
+          <a:lstStyle/>
+          <a:p>
+            <a:pPr algn="ctr"/>
+            <a:endParaRPr lang="es-ES"/>
+          </a:p>
+        </p:txBody>
+      </p:sp>
+      <p:sp>
+        <p:nvSpPr>
+          <p:cNvPr id="37" name="36 CuadroTexto"/>
+          <p:cNvSpPr txBox="1"/>
+          <p:nvPr/>
+        </p:nvSpPr>
+        <p:spPr>
+          <a:xfrm>
+            <a:off x="4107310" y="1497473"/>
+            <a:ext cx="410690" cy="261610"/>
+          </a:xfrm>
+          <a:prstGeom prst="rect">
+            <a:avLst/>
+          </a:prstGeom>
+          <a:noFill/>
+        </p:spPr>
+        <p:txBody>
+          <a:bodyPr wrap="none" rtlCol="0">
+            <a:spAutoFit/>
+          </a:bodyPr>
+          <a:lstStyle/>
+          <a:p>
+            <a:r>
+              <a:rPr lang="es-ES" sz="1100" dirty="0" smtClean="0"/>
+              <a:t>GPS</a:t>
+            </a:r>
+            <a:endParaRPr lang="es-ES" sz="1100" dirty="0"/>
           </a:p>
         </p:txBody>
       </p:sp>

</xml_diff>